<commit_message>
slide and hands on modifications
</commit_message>
<xml_diff>
--- a/docs/slides/7-Preparation.pptx
+++ b/docs/slides/7-Preparation.pptx
@@ -5,28 +5,31 @@
     <p:sldMasterId id="2147483674" r:id="rId1"/>
   </p:sldMasterIdLst>
   <p:notesMasterIdLst>
-    <p:notesMasterId r:id="rId18"/>
+    <p:notesMasterId r:id="rId21"/>
   </p:notesMasterIdLst>
   <p:handoutMasterIdLst>
-    <p:handoutMasterId r:id="rId19"/>
+    <p:handoutMasterId r:id="rId22"/>
   </p:handoutMasterIdLst>
   <p:sldIdLst>
     <p:sldId id="442" r:id="rId2"/>
-    <p:sldId id="443" r:id="rId3"/>
-    <p:sldId id="274" r:id="rId4"/>
-    <p:sldId id="300" r:id="rId5"/>
-    <p:sldId id="302" r:id="rId6"/>
-    <p:sldId id="304" r:id="rId7"/>
-    <p:sldId id="277" r:id="rId8"/>
-    <p:sldId id="278" r:id="rId9"/>
-    <p:sldId id="280" r:id="rId10"/>
-    <p:sldId id="279" r:id="rId11"/>
-    <p:sldId id="444" r:id="rId12"/>
-    <p:sldId id="258" r:id="rId13"/>
-    <p:sldId id="259" r:id="rId14"/>
-    <p:sldId id="260" r:id="rId15"/>
-    <p:sldId id="261" r:id="rId16"/>
-    <p:sldId id="262" r:id="rId17"/>
+    <p:sldId id="2565" r:id="rId3"/>
+    <p:sldId id="443" r:id="rId4"/>
+    <p:sldId id="2562" r:id="rId5"/>
+    <p:sldId id="2563" r:id="rId6"/>
+    <p:sldId id="274" r:id="rId7"/>
+    <p:sldId id="300" r:id="rId8"/>
+    <p:sldId id="302" r:id="rId9"/>
+    <p:sldId id="304" r:id="rId10"/>
+    <p:sldId id="277" r:id="rId11"/>
+    <p:sldId id="278" r:id="rId12"/>
+    <p:sldId id="280" r:id="rId13"/>
+    <p:sldId id="279" r:id="rId14"/>
+    <p:sldId id="444" r:id="rId15"/>
+    <p:sldId id="258" r:id="rId16"/>
+    <p:sldId id="259" r:id="rId17"/>
+    <p:sldId id="260" r:id="rId18"/>
+    <p:sldId id="261" r:id="rId19"/>
+    <p:sldId id="262" r:id="rId20"/>
   </p:sldIdLst>
   <p:sldSz cx="9144000" cy="5143500" type="screen16x9"/>
   <p:notesSz cx="6858000" cy="9144000"/>
@@ -684,6 +687,319 @@
       </p:grpSpPr>
       <p:sp>
         <p:nvSpPr>
+          <p:cNvPr id="405" name="Shape 405"/>
+          <p:cNvSpPr>
+            <a:spLocks noGrp="1" noRot="1" noChangeAspect="1"/>
+          </p:cNvSpPr>
+          <p:nvPr>
+            <p:ph type="sldImg"/>
+          </p:nvPr>
+        </p:nvSpPr>
+        <p:spPr>
+          <a:xfrm>
+            <a:off x="381000" y="685800"/>
+            <a:ext cx="6096000" cy="3429000"/>
+          </a:xfrm>
+          <a:prstGeom prst="rect">
+            <a:avLst/>
+          </a:prstGeom>
+        </p:spPr>
+        <p:txBody>
+          <a:bodyPr/>
+          <a:lstStyle/>
+          <a:p>
+            <a:endParaRPr/>
+          </a:p>
+        </p:txBody>
+      </p:sp>
+      <p:sp>
+        <p:nvSpPr>
+          <p:cNvPr id="406" name="Shape 406"/>
+          <p:cNvSpPr>
+            <a:spLocks noGrp="1"/>
+          </p:cNvSpPr>
+          <p:nvPr>
+            <p:ph type="body" sz="quarter" idx="1"/>
+          </p:nvPr>
+        </p:nvSpPr>
+        <p:spPr>
+          <a:prstGeom prst="rect">
+            <a:avLst/>
+          </a:prstGeom>
+        </p:spPr>
+        <p:txBody>
+          <a:bodyPr/>
+          <a:lstStyle/>
+          <a:p>
+            <a:r>
+              <a:t>Our pipeline works, but what if we want to make the representation even smaller?</a:t>
+            </a:r>
+          </a:p>
+          <a:p>
+            <a:endParaRPr/>
+          </a:p>
+          <a:p>
+            <a:r>
+              <a:t>Faster training</a:t>
+            </a:r>
+          </a:p>
+          <a:p>
+            <a:r>
+              <a:t>Faster transformation</a:t>
+            </a:r>
+          </a:p>
+        </p:txBody>
+      </p:sp>
+    </p:spTree>
+    <p:extLst>
+      <p:ext uri="{BB962C8B-B14F-4D97-AF65-F5344CB8AC3E}">
+        <p14:creationId xmlns:p14="http://schemas.microsoft.com/office/powerpoint/2010/main" val="3703313573"/>
+      </p:ext>
+    </p:extLst>
+  </p:cSld>
+  <p:clrMapOvr>
+    <a:masterClrMapping/>
+  </p:clrMapOvr>
+</p:notes>
+</file>
+
+<file path=ppt/notesSlides/notesSlide2.xml><?xml version="1.0" encoding="utf-8"?>
+<p:notes xmlns:a="http://schemas.openxmlformats.org/drawingml/2006/main" xmlns:r="http://schemas.openxmlformats.org/officeDocument/2006/relationships" xmlns:p="http://schemas.openxmlformats.org/presentationml/2006/main" showMasterSp="0" showMasterPhAnim="0">
+  <p:cSld>
+    <p:spTree>
+      <p:nvGrpSpPr>
+        <p:cNvPr id="1" name="Shape 180"/>
+        <p:cNvGrpSpPr/>
+        <p:nvPr/>
+      </p:nvGrpSpPr>
+      <p:grpSpPr>
+        <a:xfrm>
+          <a:off x="0" y="0"/>
+          <a:ext cx="0" cy="0"/>
+          <a:chOff x="0" y="0"/>
+          <a:chExt cx="0" cy="0"/>
+        </a:xfrm>
+      </p:grpSpPr>
+      <p:sp>
+        <p:nvSpPr>
+          <p:cNvPr id="181" name="Google Shape;181;g65c746a26e_0_15:notes"/>
+          <p:cNvSpPr>
+            <a:spLocks noGrp="1" noRot="1" noChangeAspect="1"/>
+          </p:cNvSpPr>
+          <p:nvPr>
+            <p:ph type="sldImg" idx="2"/>
+          </p:nvPr>
+        </p:nvSpPr>
+        <p:spPr>
+          <a:xfrm>
+            <a:off x="381000" y="685800"/>
+            <a:ext cx="6096000" cy="3429000"/>
+          </a:xfrm>
+          <a:custGeom>
+            <a:avLst/>
+            <a:gdLst/>
+            <a:ahLst/>
+            <a:cxnLst/>
+            <a:rect l="l" t="t" r="r" b="b"/>
+            <a:pathLst>
+              <a:path w="120000" h="120000" extrusionOk="0">
+                <a:moveTo>
+                  <a:pt x="0" y="0"/>
+                </a:moveTo>
+                <a:lnTo>
+                  <a:pt x="120000" y="0"/>
+                </a:lnTo>
+                <a:lnTo>
+                  <a:pt x="120000" y="120000"/>
+                </a:lnTo>
+                <a:lnTo>
+                  <a:pt x="0" y="120000"/>
+                </a:lnTo>
+                <a:close/>
+              </a:path>
+            </a:pathLst>
+          </a:custGeom>
+        </p:spPr>
+      </p:sp>
+      <p:sp>
+        <p:nvSpPr>
+          <p:cNvPr id="182" name="Google Shape;182;g65c746a26e_0_15:notes"/>
+          <p:cNvSpPr txBox="1">
+            <a:spLocks noGrp="1"/>
+          </p:cNvSpPr>
+          <p:nvPr>
+            <p:ph type="body" idx="1"/>
+          </p:nvPr>
+        </p:nvSpPr>
+        <p:spPr>
+          <a:xfrm>
+            <a:off x="685800" y="4343400"/>
+            <a:ext cx="5486400" cy="4114800"/>
+          </a:xfrm>
+          <a:prstGeom prst="rect">
+            <a:avLst/>
+          </a:prstGeom>
+        </p:spPr>
+        <p:txBody>
+          <a:bodyPr spcFirstLastPara="1" wrap="square" lIns="91425" tIns="91425" rIns="91425" bIns="91425" anchor="t" anchorCtr="0">
+            <a:noAutofit/>
+          </a:bodyPr>
+          <a:lstStyle/>
+          <a:p>
+            <a:pPr marL="0" lvl="0" indent="0" algn="l" rtl="0">
+              <a:spcBef>
+                <a:spcPts val="0"/>
+              </a:spcBef>
+              <a:spcAft>
+                <a:spcPts val="0"/>
+              </a:spcAft>
+              <a:buNone/>
+            </a:pPr>
+            <a:endParaRPr/>
+          </a:p>
+        </p:txBody>
+      </p:sp>
+    </p:spTree>
+    <p:extLst>
+      <p:ext uri="{BB962C8B-B14F-4D97-AF65-F5344CB8AC3E}">
+        <p14:creationId xmlns:p14="http://schemas.microsoft.com/office/powerpoint/2010/main" val="2493588536"/>
+      </p:ext>
+    </p:extLst>
+  </p:cSld>
+  <p:clrMapOvr>
+    <a:masterClrMapping/>
+  </p:clrMapOvr>
+</p:notes>
+</file>
+
+<file path=ppt/notesSlides/notesSlide3.xml><?xml version="1.0" encoding="utf-8"?>
+<p:notes xmlns:a="http://schemas.openxmlformats.org/drawingml/2006/main" xmlns:r="http://schemas.openxmlformats.org/officeDocument/2006/relationships" xmlns:p="http://schemas.openxmlformats.org/presentationml/2006/main" showMasterSp="0" showMasterPhAnim="0">
+  <p:cSld>
+    <p:spTree>
+      <p:nvGrpSpPr>
+        <p:cNvPr id="1" name="Shape 186"/>
+        <p:cNvGrpSpPr/>
+        <p:nvPr/>
+      </p:nvGrpSpPr>
+      <p:grpSpPr>
+        <a:xfrm>
+          <a:off x="0" y="0"/>
+          <a:ext cx="0" cy="0"/>
+          <a:chOff x="0" y="0"/>
+          <a:chExt cx="0" cy="0"/>
+        </a:xfrm>
+      </p:grpSpPr>
+      <p:sp>
+        <p:nvSpPr>
+          <p:cNvPr id="187" name="Google Shape;187;g65c746a26e_0_20:notes"/>
+          <p:cNvSpPr>
+            <a:spLocks noGrp="1" noRot="1" noChangeAspect="1"/>
+          </p:cNvSpPr>
+          <p:nvPr>
+            <p:ph type="sldImg" idx="2"/>
+          </p:nvPr>
+        </p:nvSpPr>
+        <p:spPr>
+          <a:xfrm>
+            <a:off x="381000" y="685800"/>
+            <a:ext cx="6096000" cy="3429000"/>
+          </a:xfrm>
+          <a:custGeom>
+            <a:avLst/>
+            <a:gdLst/>
+            <a:ahLst/>
+            <a:cxnLst/>
+            <a:rect l="l" t="t" r="r" b="b"/>
+            <a:pathLst>
+              <a:path w="120000" h="120000" extrusionOk="0">
+                <a:moveTo>
+                  <a:pt x="0" y="0"/>
+                </a:moveTo>
+                <a:lnTo>
+                  <a:pt x="120000" y="0"/>
+                </a:lnTo>
+                <a:lnTo>
+                  <a:pt x="120000" y="120000"/>
+                </a:lnTo>
+                <a:lnTo>
+                  <a:pt x="0" y="120000"/>
+                </a:lnTo>
+                <a:close/>
+              </a:path>
+            </a:pathLst>
+          </a:custGeom>
+        </p:spPr>
+      </p:sp>
+      <p:sp>
+        <p:nvSpPr>
+          <p:cNvPr id="188" name="Google Shape;188;g65c746a26e_0_20:notes"/>
+          <p:cNvSpPr txBox="1">
+            <a:spLocks noGrp="1"/>
+          </p:cNvSpPr>
+          <p:nvPr>
+            <p:ph type="body" idx="1"/>
+          </p:nvPr>
+        </p:nvSpPr>
+        <p:spPr>
+          <a:xfrm>
+            <a:off x="685800" y="4343400"/>
+            <a:ext cx="5486400" cy="4114800"/>
+          </a:xfrm>
+          <a:prstGeom prst="rect">
+            <a:avLst/>
+          </a:prstGeom>
+        </p:spPr>
+        <p:txBody>
+          <a:bodyPr spcFirstLastPara="1" wrap="square" lIns="91425" tIns="91425" rIns="91425" bIns="91425" anchor="t" anchorCtr="0">
+            <a:noAutofit/>
+          </a:bodyPr>
+          <a:lstStyle/>
+          <a:p>
+            <a:pPr marL="0" lvl="0" indent="0" algn="l" rtl="0">
+              <a:spcBef>
+                <a:spcPts val="0"/>
+              </a:spcBef>
+              <a:spcAft>
+                <a:spcPts val="0"/>
+              </a:spcAft>
+              <a:buNone/>
+            </a:pPr>
+            <a:endParaRPr/>
+          </a:p>
+        </p:txBody>
+      </p:sp>
+    </p:spTree>
+    <p:extLst>
+      <p:ext uri="{BB962C8B-B14F-4D97-AF65-F5344CB8AC3E}">
+        <p14:creationId xmlns:p14="http://schemas.microsoft.com/office/powerpoint/2010/main" val="3263140298"/>
+      </p:ext>
+    </p:extLst>
+  </p:cSld>
+  <p:clrMapOvr>
+    <a:masterClrMapping/>
+  </p:clrMapOvr>
+</p:notes>
+</file>
+
+<file path=ppt/notesSlides/notesSlide4.xml><?xml version="1.0" encoding="utf-8"?>
+<p:notes xmlns:a="http://schemas.openxmlformats.org/drawingml/2006/main" xmlns:r="http://schemas.openxmlformats.org/officeDocument/2006/relationships" xmlns:p="http://schemas.openxmlformats.org/presentationml/2006/main">
+  <p:cSld>
+    <p:spTree>
+      <p:nvGrpSpPr>
+        <p:cNvPr id="1" name=""/>
+        <p:cNvGrpSpPr/>
+        <p:nvPr/>
+      </p:nvGrpSpPr>
+      <p:grpSpPr>
+        <a:xfrm>
+          <a:off x="0" y="0"/>
+          <a:ext cx="0" cy="0"/>
+          <a:chOff x="0" y="0"/>
+          <a:chExt cx="0" cy="0"/>
+        </a:xfrm>
+      </p:grpSpPr>
+      <p:sp>
+        <p:nvSpPr>
           <p:cNvPr id="2" name="Slide Image Placeholder 1"/>
           <p:cNvSpPr>
             <a:spLocks noGrp="1" noRot="1" noChangeAspect="1"/>
@@ -730,7 +1046,7 @@
           <a:p>
             <a:fld id="{87916DAE-669F-3546-9A68-DB1260F5EB98}" type="slidenum">
               <a:rPr lang="en-US" smtClean="0"/>
-              <a:t>3</a:t>
+              <a:t>6</a:t>
             </a:fld>
             <a:endParaRPr lang="en-US"/>
           </a:p>
@@ -4495,18 +4811,13 @@
           <a:lstStyle/>
           <a:p>
             <a:r>
-              <a:rPr lang="en-US">
+              <a:rPr lang="en-US" dirty="0">
                 <a:solidFill>
                   <a:schemeClr val="tx1"/>
                 </a:solidFill>
               </a:rPr>
-              <a:t>Combining Features</a:t>
-            </a:r>
-            <a:endParaRPr lang="en-US" dirty="0">
-              <a:solidFill>
-                <a:schemeClr val="tx1"/>
-              </a:solidFill>
-            </a:endParaRPr>
+              <a:t>Normalization</a:t>
+            </a:r>
           </a:p>
         </p:txBody>
       </p:sp>
@@ -4517,7 +4828,7 @@
             <a:spLocks noGrp="1"/>
           </p:cNvSpPr>
           <p:nvPr>
-            <p:ph idx="1"/>
+            <p:ph type="body" idx="1"/>
           </p:nvPr>
         </p:nvSpPr>
         <p:spPr/>
@@ -4527,34 +4838,71 @@
           <a:p>
             <a:r>
               <a:rPr lang="en-US" dirty="0"/>
-              <a:t>Generate features for combination of features (product of two features)</a:t>
-            </a:r>
-            <a:br>
+              <a:t>Often a good idea to scale features to have similar range:  [-1,1] or [0,1] for example</a:t>
+            </a:r>
+          </a:p>
+          <a:p>
+            <a:pPr lvl="1"/>
+            <a:r>
+              <a:rPr lang="en-US" sz="2100" dirty="0"/>
+              <a:t>Be careful with outliers</a:t>
+            </a:r>
+          </a:p>
+          <a:p>
+            <a:pPr lvl="1"/>
+            <a:endParaRPr lang="en-US" sz="2100" dirty="0"/>
+          </a:p>
+          <a:p>
+            <a:r>
               <a:rPr lang="en-US" dirty="0"/>
-            </a:br>
-            <a:endParaRPr lang="en-US" dirty="0"/>
-          </a:p>
-          <a:p>
-            <a:r>
-              <a:rPr lang="en-US" dirty="0"/>
-              <a:t>Can use linear models but still model non-linear relationships</a:t>
-            </a:r>
-          </a:p>
-          <a:p>
-            <a:endParaRPr lang="en-US" dirty="0"/>
-          </a:p>
-          <a:p>
-            <a:r>
-              <a:rPr lang="en-US" dirty="0"/>
-              <a:t>Random Forests are one way of discovering useful interactions</a:t>
-            </a:r>
-          </a:p>
-        </p:txBody>
-      </p:sp>
+              <a:t>Standardize/Normalize</a:t>
+            </a:r>
+          </a:p>
+          <a:p>
+            <a:pPr lvl="1"/>
+            <a:r>
+              <a:rPr lang="en-US" sz="2100" dirty="0"/>
+              <a:t>Zero mean and unit variance</a:t>
+            </a:r>
+          </a:p>
+          <a:p>
+            <a:pPr lvl="1"/>
+            <a:r>
+              <a:rPr lang="en-US" sz="2100" dirty="0" err="1"/>
+              <a:t>Sklearn.preprocessing.normalize</a:t>
+            </a:r>
+            <a:endParaRPr lang="en-US" sz="2100" dirty="0"/>
+          </a:p>
+        </p:txBody>
+      </p:sp>
+      <p:pic>
+        <p:nvPicPr>
+          <p:cNvPr id="4" name="Picture 3"/>
+          <p:cNvPicPr>
+            <a:picLocks noChangeAspect="1"/>
+          </p:cNvPicPr>
+          <p:nvPr/>
+        </p:nvPicPr>
+        <p:blipFill>
+          <a:blip r:embed="rId2"/>
+          <a:stretch>
+            <a:fillRect/>
+          </a:stretch>
+        </p:blipFill>
+        <p:spPr>
+          <a:xfrm>
+            <a:off x="5418754" y="3012656"/>
+            <a:ext cx="1905000" cy="828675"/>
+          </a:xfrm>
+          <a:prstGeom prst="rect">
+            <a:avLst/>
+          </a:prstGeom>
+        </p:spPr>
+      </p:pic>
     </p:spTree>
     <p:extLst>
       <p:ext uri="{BB962C8B-B14F-4D97-AF65-F5344CB8AC3E}">
-        <p14:creationId xmlns:p14="http://schemas.microsoft.com/office/powerpoint/2010/main" val="2835794600"/>
+        <p14:creationId xmlns:p14="http://schemas.microsoft.com/office/powerpoint/2010/main" val="1008191164"/>
       </p:ext>
     </p:extLst>
   </p:cSld>
@@ -4583,13 +4931,7 @@
       </p:grpSpPr>
       <p:sp>
         <p:nvSpPr>
-          <p:cNvPr id="2" name="Title 1">
-            <a:extLst>
-              <a:ext uri="{FF2B5EF4-FFF2-40B4-BE49-F238E27FC236}">
-                <a16:creationId xmlns:a16="http://schemas.microsoft.com/office/drawing/2014/main" id="{6FA7F04B-7C0A-9C4A-BB06-32579D454B02}"/>
-              </a:ext>
-            </a:extLst>
-          </p:cNvPr>
+          <p:cNvPr id="3" name="Title 2"/>
           <p:cNvSpPr>
             <a:spLocks noGrp="1"/>
           </p:cNvSpPr>
@@ -4597,33 +4939,154 @@
             <p:ph type="title"/>
           </p:nvPr>
         </p:nvSpPr>
+        <p:spPr/>
+        <p:txBody>
+          <a:bodyPr/>
+          <a:lstStyle/>
+          <a:p>
+            <a:r>
+              <a:rPr lang="en-US" dirty="0">
+                <a:solidFill>
+                  <a:schemeClr val="tx1"/>
+                </a:solidFill>
+              </a:rPr>
+              <a:t>Feature Transformations</a:t>
+            </a:r>
+          </a:p>
+        </p:txBody>
+      </p:sp>
+      <p:sp>
+        <p:nvSpPr>
+          <p:cNvPr id="2" name="Content Placeholder 1"/>
+          <p:cNvSpPr>
+            <a:spLocks noGrp="1"/>
+          </p:cNvSpPr>
+          <p:nvPr>
+            <p:ph idx="1"/>
+          </p:nvPr>
+        </p:nvSpPr>
+        <p:spPr/>
+        <p:txBody>
+          <a:bodyPr/>
+          <a:lstStyle/>
+          <a:p>
+            <a:r>
+              <a:rPr lang="en-US" dirty="0"/>
+              <a:t>Non-linear </a:t>
+            </a:r>
+          </a:p>
+          <a:p>
+            <a:endParaRPr lang="en-US" dirty="0"/>
+          </a:p>
+          <a:p>
+            <a:pPr lvl="1"/>
+            <a:r>
+              <a:rPr lang="en-US" dirty="0"/>
+              <a:t>Log (decreasing marginal utility)</a:t>
+            </a:r>
+          </a:p>
+          <a:p>
+            <a:pPr marL="342900" lvl="1" indent="0">
+              <a:buNone/>
+            </a:pPr>
+            <a:endParaRPr lang="en-US" dirty="0"/>
+          </a:p>
+          <a:p>
+            <a:pPr lvl="1"/>
+            <a:r>
+              <a:rPr lang="en-US" dirty="0"/>
+              <a:t>(Square) Root</a:t>
+            </a:r>
+          </a:p>
+          <a:p>
+            <a:pPr lvl="1"/>
+            <a:endParaRPr lang="en-US" dirty="0"/>
+          </a:p>
+          <a:p>
+            <a:pPr lvl="1"/>
+            <a:r>
+              <a:rPr lang="en-US" dirty="0"/>
+              <a:t>Squared</a:t>
+            </a:r>
+          </a:p>
+        </p:txBody>
+      </p:sp>
+      <p:pic>
+        <p:nvPicPr>
+          <p:cNvPr id="4" name="Picture 3"/>
+          <p:cNvPicPr>
+            <a:picLocks noChangeAspect="1"/>
+          </p:cNvPicPr>
+          <p:nvPr/>
+        </p:nvPicPr>
+        <p:blipFill>
+          <a:blip r:embed="rId2"/>
+          <a:stretch>
+            <a:fillRect/>
+          </a:stretch>
+        </p:blipFill>
         <p:spPr>
           <a:xfrm>
-            <a:off x="628650" y="1385039"/>
-            <a:ext cx="7886700" cy="994172"/>
+            <a:off x="6806589" y="3419683"/>
+            <a:ext cx="1531984" cy="1249776"/>
           </a:xfrm>
+          <a:prstGeom prst="rect">
+            <a:avLst/>
+          </a:prstGeom>
         </p:spPr>
-        <p:txBody>
-          <a:bodyPr/>
-          <a:lstStyle/>
-          <a:p>
-            <a:pPr algn="ctr"/>
-            <a:r>
-              <a:rPr lang="en-US" dirty="0"/>
-              <a:t>Pitfalls with </a:t>
-            </a:r>
-            <a:r>
-              <a:rPr lang="en-US"/>
-              <a:t>Training Data</a:t>
-            </a:r>
-            <a:endParaRPr lang="en-US" dirty="0"/>
-          </a:p>
-        </p:txBody>
-      </p:sp>
+      </p:pic>
+      <p:pic>
+        <p:nvPicPr>
+          <p:cNvPr id="5" name="Picture 4"/>
+          <p:cNvPicPr>
+            <a:picLocks noChangeAspect="1"/>
+          </p:cNvPicPr>
+          <p:nvPr/>
+        </p:nvPicPr>
+        <p:blipFill>
+          <a:blip r:embed="rId3"/>
+          <a:stretch>
+            <a:fillRect/>
+          </a:stretch>
+        </p:blipFill>
+        <p:spPr>
+          <a:xfrm>
+            <a:off x="4436028" y="3260015"/>
+            <a:ext cx="1876910" cy="1460364"/>
+          </a:xfrm>
+          <a:prstGeom prst="rect">
+            <a:avLst/>
+          </a:prstGeom>
+        </p:spPr>
+      </p:pic>
+      <p:pic>
+        <p:nvPicPr>
+          <p:cNvPr id="6" name="Picture 5"/>
+          <p:cNvPicPr>
+            <a:picLocks noChangeAspect="1"/>
+          </p:cNvPicPr>
+          <p:nvPr/>
+        </p:nvPicPr>
+        <p:blipFill>
+          <a:blip r:embed="rId4"/>
+          <a:stretch>
+            <a:fillRect/>
+          </a:stretch>
+        </p:blipFill>
+        <p:spPr>
+          <a:xfrm>
+            <a:off x="2981930" y="3475109"/>
+            <a:ext cx="1314612" cy="1396775"/>
+          </a:xfrm>
+          <a:prstGeom prst="rect">
+            <a:avLst/>
+          </a:prstGeom>
+        </p:spPr>
+      </p:pic>
     </p:spTree>
     <p:extLst>
       <p:ext uri="{BB962C8B-B14F-4D97-AF65-F5344CB8AC3E}">
-        <p14:creationId xmlns:p14="http://schemas.microsoft.com/office/powerpoint/2010/main" val="885527066"/>
+        <p14:creationId xmlns:p14="http://schemas.microsoft.com/office/powerpoint/2010/main" val="3282596412"/>
       </p:ext>
     </p:extLst>
   </p:cSld>
@@ -4652,6 +5115,291 @@
       </p:grpSpPr>
       <p:sp>
         <p:nvSpPr>
+          <p:cNvPr id="3" name="Title 2"/>
+          <p:cNvSpPr>
+            <a:spLocks noGrp="1"/>
+          </p:cNvSpPr>
+          <p:nvPr>
+            <p:ph type="title"/>
+          </p:nvPr>
+        </p:nvSpPr>
+        <p:spPr/>
+        <p:txBody>
+          <a:bodyPr/>
+          <a:lstStyle/>
+          <a:p>
+            <a:r>
+              <a:rPr lang="en-US" dirty="0">
+                <a:solidFill>
+                  <a:schemeClr val="tx1"/>
+                </a:solidFill>
+              </a:rPr>
+              <a:t>Aggregation</a:t>
+            </a:r>
+          </a:p>
+        </p:txBody>
+      </p:sp>
+      <p:sp>
+        <p:nvSpPr>
+          <p:cNvPr id="2" name="Content Placeholder 1"/>
+          <p:cNvSpPr>
+            <a:spLocks noGrp="1"/>
+          </p:cNvSpPr>
+          <p:nvPr>
+            <p:ph idx="1"/>
+          </p:nvPr>
+        </p:nvSpPr>
+        <p:spPr/>
+        <p:txBody>
+          <a:bodyPr>
+            <a:normAutofit/>
+          </a:bodyPr>
+          <a:lstStyle/>
+          <a:p>
+            <a:r>
+              <a:rPr lang="en-US" sz="2700" dirty="0"/>
+              <a:t>Date differences (# of days since…)</a:t>
+            </a:r>
+          </a:p>
+          <a:p>
+            <a:r>
+              <a:rPr lang="en-US" sz="2700" dirty="0"/>
+              <a:t>Aggregates over different time periods</a:t>
+            </a:r>
+          </a:p>
+          <a:p>
+            <a:r>
+              <a:rPr lang="en-US" sz="2700" dirty="0"/>
+              <a:t>Relative aggregates</a:t>
+            </a:r>
+          </a:p>
+          <a:p>
+            <a:r>
+              <a:rPr lang="en-US" sz="2700" dirty="0"/>
+              <a:t>Distances</a:t>
+            </a:r>
+          </a:p>
+          <a:p>
+            <a:r>
+              <a:rPr lang="en-US" sz="2700" dirty="0"/>
+              <a:t>Aggregates over different distances</a:t>
+            </a:r>
+          </a:p>
+          <a:p>
+            <a:r>
+              <a:rPr lang="en-US" sz="2700" dirty="0"/>
+              <a:t>Seasonality</a:t>
+            </a:r>
+          </a:p>
+          <a:p>
+            <a:endParaRPr lang="en-US" sz="2700" dirty="0"/>
+          </a:p>
+          <a:p>
+            <a:endParaRPr lang="en-US" sz="2700" dirty="0"/>
+          </a:p>
+          <a:p>
+            <a:endParaRPr lang="en-US" sz="2700" dirty="0"/>
+          </a:p>
+        </p:txBody>
+      </p:sp>
+    </p:spTree>
+    <p:extLst>
+      <p:ext uri="{BB962C8B-B14F-4D97-AF65-F5344CB8AC3E}">
+        <p14:creationId xmlns:p14="http://schemas.microsoft.com/office/powerpoint/2010/main" val="3227679789"/>
+      </p:ext>
+    </p:extLst>
+  </p:cSld>
+  <p:clrMapOvr>
+    <a:masterClrMapping/>
+  </p:clrMapOvr>
+</p:sld>
+</file>
+
+<file path=ppt/slides/slide13.xml><?xml version="1.0" encoding="utf-8"?>
+<p:sld xmlns:a="http://schemas.openxmlformats.org/drawingml/2006/main" xmlns:r="http://schemas.openxmlformats.org/officeDocument/2006/relationships" xmlns:p="http://schemas.openxmlformats.org/presentationml/2006/main">
+  <p:cSld>
+    <p:spTree>
+      <p:nvGrpSpPr>
+        <p:cNvPr id="1" name=""/>
+        <p:cNvGrpSpPr/>
+        <p:nvPr/>
+      </p:nvGrpSpPr>
+      <p:grpSpPr>
+        <a:xfrm>
+          <a:off x="0" y="0"/>
+          <a:ext cx="0" cy="0"/>
+          <a:chOff x="0" y="0"/>
+          <a:chExt cx="0" cy="0"/>
+        </a:xfrm>
+      </p:grpSpPr>
+      <p:sp>
+        <p:nvSpPr>
+          <p:cNvPr id="3" name="Title 2"/>
+          <p:cNvSpPr>
+            <a:spLocks noGrp="1"/>
+          </p:cNvSpPr>
+          <p:nvPr>
+            <p:ph type="title"/>
+          </p:nvPr>
+        </p:nvSpPr>
+        <p:spPr/>
+        <p:txBody>
+          <a:bodyPr/>
+          <a:lstStyle/>
+          <a:p>
+            <a:r>
+              <a:rPr lang="en-US">
+                <a:solidFill>
+                  <a:schemeClr val="tx1"/>
+                </a:solidFill>
+              </a:rPr>
+              <a:t>Combining Features</a:t>
+            </a:r>
+            <a:endParaRPr lang="en-US" dirty="0">
+              <a:solidFill>
+                <a:schemeClr val="tx1"/>
+              </a:solidFill>
+            </a:endParaRPr>
+          </a:p>
+        </p:txBody>
+      </p:sp>
+      <p:sp>
+        <p:nvSpPr>
+          <p:cNvPr id="2" name="Content Placeholder 1"/>
+          <p:cNvSpPr>
+            <a:spLocks noGrp="1"/>
+          </p:cNvSpPr>
+          <p:nvPr>
+            <p:ph idx="1"/>
+          </p:nvPr>
+        </p:nvSpPr>
+        <p:spPr/>
+        <p:txBody>
+          <a:bodyPr/>
+          <a:lstStyle/>
+          <a:p>
+            <a:r>
+              <a:rPr lang="en-US" dirty="0"/>
+              <a:t>Generate features for combination of features (product of two features)</a:t>
+            </a:r>
+            <a:br>
+              <a:rPr lang="en-US" dirty="0"/>
+            </a:br>
+            <a:endParaRPr lang="en-US" dirty="0"/>
+          </a:p>
+          <a:p>
+            <a:r>
+              <a:rPr lang="en-US" dirty="0"/>
+              <a:t>Can use linear models but still model non-linear relationships</a:t>
+            </a:r>
+          </a:p>
+          <a:p>
+            <a:endParaRPr lang="en-US" dirty="0"/>
+          </a:p>
+          <a:p>
+            <a:r>
+              <a:rPr lang="en-US" dirty="0"/>
+              <a:t>Random Forests are one way of discovering useful interactions</a:t>
+            </a:r>
+          </a:p>
+        </p:txBody>
+      </p:sp>
+    </p:spTree>
+    <p:extLst>
+      <p:ext uri="{BB962C8B-B14F-4D97-AF65-F5344CB8AC3E}">
+        <p14:creationId xmlns:p14="http://schemas.microsoft.com/office/powerpoint/2010/main" val="2835794600"/>
+      </p:ext>
+    </p:extLst>
+  </p:cSld>
+  <p:clrMapOvr>
+    <a:masterClrMapping/>
+  </p:clrMapOvr>
+</p:sld>
+</file>
+
+<file path=ppt/slides/slide14.xml><?xml version="1.0" encoding="utf-8"?>
+<p:sld xmlns:a="http://schemas.openxmlformats.org/drawingml/2006/main" xmlns:r="http://schemas.openxmlformats.org/officeDocument/2006/relationships" xmlns:p="http://schemas.openxmlformats.org/presentationml/2006/main">
+  <p:cSld>
+    <p:spTree>
+      <p:nvGrpSpPr>
+        <p:cNvPr id="1" name=""/>
+        <p:cNvGrpSpPr/>
+        <p:nvPr/>
+      </p:nvGrpSpPr>
+      <p:grpSpPr>
+        <a:xfrm>
+          <a:off x="0" y="0"/>
+          <a:ext cx="0" cy="0"/>
+          <a:chOff x="0" y="0"/>
+          <a:chExt cx="0" cy="0"/>
+        </a:xfrm>
+      </p:grpSpPr>
+      <p:sp>
+        <p:nvSpPr>
+          <p:cNvPr id="2" name="Title 1">
+            <a:extLst>
+              <a:ext uri="{FF2B5EF4-FFF2-40B4-BE49-F238E27FC236}">
+                <a16:creationId xmlns:a16="http://schemas.microsoft.com/office/drawing/2014/main" id="{6FA7F04B-7C0A-9C4A-BB06-32579D454B02}"/>
+              </a:ext>
+            </a:extLst>
+          </p:cNvPr>
+          <p:cNvSpPr>
+            <a:spLocks noGrp="1"/>
+          </p:cNvSpPr>
+          <p:nvPr>
+            <p:ph type="title"/>
+          </p:nvPr>
+        </p:nvSpPr>
+        <p:spPr>
+          <a:xfrm>
+            <a:off x="628650" y="1385039"/>
+            <a:ext cx="7886700" cy="994172"/>
+          </a:xfrm>
+        </p:spPr>
+        <p:txBody>
+          <a:bodyPr/>
+          <a:lstStyle/>
+          <a:p>
+            <a:pPr algn="ctr"/>
+            <a:r>
+              <a:rPr lang="en-US" dirty="0"/>
+              <a:t>Pitfalls with Training Data</a:t>
+            </a:r>
+          </a:p>
+        </p:txBody>
+      </p:sp>
+    </p:spTree>
+    <p:extLst>
+      <p:ext uri="{BB962C8B-B14F-4D97-AF65-F5344CB8AC3E}">
+        <p14:creationId xmlns:p14="http://schemas.microsoft.com/office/powerpoint/2010/main" val="885527066"/>
+      </p:ext>
+    </p:extLst>
+  </p:cSld>
+  <p:clrMapOvr>
+    <a:masterClrMapping/>
+  </p:clrMapOvr>
+</p:sld>
+</file>
+
+<file path=ppt/slides/slide15.xml><?xml version="1.0" encoding="utf-8"?>
+<p:sld xmlns:a="http://schemas.openxmlformats.org/drawingml/2006/main" xmlns:r="http://schemas.openxmlformats.org/officeDocument/2006/relationships" xmlns:p="http://schemas.openxmlformats.org/presentationml/2006/main">
+  <p:cSld>
+    <p:spTree>
+      <p:nvGrpSpPr>
+        <p:cNvPr id="1" name=""/>
+        <p:cNvGrpSpPr/>
+        <p:nvPr/>
+      </p:nvGrpSpPr>
+      <p:grpSpPr>
+        <a:xfrm>
+          <a:off x="0" y="0"/>
+          <a:ext cx="0" cy="0"/>
+          <a:chOff x="0" y="0"/>
+          <a:chExt cx="0" cy="0"/>
+        </a:xfrm>
+      </p:grpSpPr>
+      <p:sp>
+        <p:nvSpPr>
           <p:cNvPr id="2" name="Title 1">
             <a:extLst>
               <a:ext uri="{FF2B5EF4-FFF2-40B4-BE49-F238E27FC236}">
@@ -4743,7 +5491,7 @@
 </p:sld>
 </file>
 
-<file path=ppt/slides/slide13.xml><?xml version="1.0" encoding="utf-8"?>
+<file path=ppt/slides/slide16.xml><?xml version="1.0" encoding="utf-8"?>
 <p:sld xmlns:a="http://schemas.openxmlformats.org/drawingml/2006/main" xmlns:r="http://schemas.openxmlformats.org/officeDocument/2006/relationships" xmlns:p="http://schemas.openxmlformats.org/presentationml/2006/main">
   <p:cSld>
     <p:spTree>
@@ -4951,7 +5699,7 @@
 </p:sld>
 </file>
 
-<file path=ppt/slides/slide14.xml><?xml version="1.0" encoding="utf-8"?>
+<file path=ppt/slides/slide17.xml><?xml version="1.0" encoding="utf-8"?>
 <p:sld xmlns:a="http://schemas.openxmlformats.org/drawingml/2006/main" xmlns:r="http://schemas.openxmlformats.org/officeDocument/2006/relationships" xmlns:p="http://schemas.openxmlformats.org/presentationml/2006/main">
   <p:cSld>
     <p:spTree>
@@ -5101,7 +5849,7 @@
 </p:sld>
 </file>
 
-<file path=ppt/slides/slide15.xml><?xml version="1.0" encoding="utf-8"?>
+<file path=ppt/slides/slide18.xml><?xml version="1.0" encoding="utf-8"?>
 <p:sld xmlns:a="http://schemas.openxmlformats.org/drawingml/2006/main" xmlns:r="http://schemas.openxmlformats.org/officeDocument/2006/relationships" xmlns:p="http://schemas.openxmlformats.org/presentationml/2006/main">
   <p:cSld>
     <p:spTree>
@@ -5235,7 +5983,7 @@
 </p:sld>
 </file>
 
-<file path=ppt/slides/slide16.xml><?xml version="1.0" encoding="utf-8"?>
+<file path=ppt/slides/slide19.xml><?xml version="1.0" encoding="utf-8"?>
 <p:sld xmlns:a="http://schemas.openxmlformats.org/drawingml/2006/main" xmlns:r="http://schemas.openxmlformats.org/officeDocument/2006/relationships" xmlns:p="http://schemas.openxmlformats.org/presentationml/2006/main">
   <p:cSld>
     <p:spTree>
@@ -5454,10 +6202,43 @@
       </p:grpSpPr>
       <p:sp>
         <p:nvSpPr>
-          <p:cNvPr id="2" name="Title 1">
+          <p:cNvPr id="385" name="Pipeline"/>
+          <p:cNvSpPr txBox="1">
+            <a:spLocks noGrp="1"/>
+          </p:cNvSpPr>
+          <p:nvPr>
+            <p:ph type="title"/>
+          </p:nvPr>
+        </p:nvSpPr>
+        <p:spPr>
+          <a:xfrm>
+            <a:off x="340478" y="83020"/>
+            <a:ext cx="7886700" cy="994172"/>
+          </a:xfrm>
+          <a:prstGeom prst="rect">
+            <a:avLst/>
+          </a:prstGeom>
+        </p:spPr>
+        <p:txBody>
+          <a:bodyPr>
+            <a:normAutofit/>
+          </a:bodyPr>
+          <a:lstStyle/>
+          <a:p>
+            <a:r>
+              <a:rPr lang="en-US" sz="3600" dirty="0"/>
+              <a:t>Machine Learning Framework</a:t>
+            </a:r>
+            <a:endParaRPr sz="3600" dirty="0"/>
+          </a:p>
+        </p:txBody>
+      </p:sp>
+      <p:sp>
+        <p:nvSpPr>
+          <p:cNvPr id="3" name="Content Placeholder 2">
             <a:extLst>
               <a:ext uri="{FF2B5EF4-FFF2-40B4-BE49-F238E27FC236}">
-                <a16:creationId xmlns:a16="http://schemas.microsoft.com/office/drawing/2014/main" id="{6FA7F04B-7C0A-9C4A-BB06-32579D454B02}"/>
+                <a16:creationId xmlns:a16="http://schemas.microsoft.com/office/drawing/2014/main" id="{94768CC8-67C3-ED45-BA58-58D4F235F38C}"/>
               </a:ext>
             </a:extLst>
           </p:cNvPr>
@@ -5465,23 +6246,707 @@
             <a:spLocks noGrp="1"/>
           </p:cNvSpPr>
           <p:nvPr>
-            <p:ph type="title"/>
+            <p:ph idx="1"/>
           </p:nvPr>
         </p:nvSpPr>
         <p:spPr>
           <a:xfrm>
-            <a:off x="628650" y="1385039"/>
-            <a:ext cx="7886700" cy="994172"/>
+            <a:off x="666450" y="3288471"/>
+            <a:ext cx="7886700" cy="1231328"/>
           </a:xfrm>
         </p:spPr>
         <p:txBody>
-          <a:bodyPr/>
+          <a:bodyPr>
+            <a:normAutofit fontScale="85000" lnSpcReduction="10000"/>
+          </a:bodyPr>
+          <a:lstStyle/>
+          <a:p>
+            <a:r>
+              <a:rPr lang="en-US" dirty="0"/>
+              <a:t>Each step has an associated cost.</a:t>
+            </a:r>
+          </a:p>
+          <a:p>
+            <a:r>
+              <a:rPr lang="en-US" dirty="0"/>
+              <a:t>Goals:</a:t>
+            </a:r>
+          </a:p>
+          <a:p>
+            <a:pPr lvl="1"/>
+            <a:r>
+              <a:rPr lang="en-US" dirty="0"/>
+              <a:t>Explore general capabilities, capturing the limits of what is possible in traffic analysis</a:t>
+            </a:r>
+          </a:p>
+          <a:p>
+            <a:pPr lvl="1"/>
+            <a:r>
+              <a:rPr lang="en-US" dirty="0"/>
+              <a:t>Consider cost-accuracy tradeoffs</a:t>
+            </a:r>
+          </a:p>
+        </p:txBody>
+      </p:sp>
+      <p:pic>
+        <p:nvPicPr>
+          <p:cNvPr id="387" name="Image" descr="Image"/>
+          <p:cNvPicPr>
+            <a:picLocks noChangeAspect="1"/>
+          </p:cNvPicPr>
+          <p:nvPr/>
+        </p:nvPicPr>
+        <p:blipFill>
+          <a:blip r:embed="rId3"/>
+          <a:stretch>
+            <a:fillRect/>
+          </a:stretch>
+        </p:blipFill>
+        <p:spPr>
+          <a:xfrm>
+            <a:off x="409867" y="1677717"/>
+            <a:ext cx="609657" cy="609657"/>
+          </a:xfrm>
+          <a:prstGeom prst="rect">
+            <a:avLst/>
+          </a:prstGeom>
+          <a:ln w="12700">
+            <a:miter lim="400000"/>
+          </a:ln>
+        </p:spPr>
+      </p:pic>
+      <p:sp>
+        <p:nvSpPr>
+          <p:cNvPr id="388" name="Input…"/>
+          <p:cNvSpPr txBox="1"/>
+          <p:nvPr/>
+        </p:nvSpPr>
+        <p:spPr>
+          <a:xfrm>
+            <a:off x="299107" y="2342924"/>
+            <a:ext cx="650499" cy="442557"/>
+          </a:xfrm>
+          <a:prstGeom prst="rect">
+            <a:avLst/>
+          </a:prstGeom>
+          <a:ln w="12700">
+            <a:miter lim="400000"/>
+          </a:ln>
+          <a:extLst>
+            <a:ext uri="{C572A759-6A51-4108-AA02-DFA0A04FC94B}">
+              <ma14:wrappingTextBoxFlag xmlns="" xmlns:m="http://schemas.openxmlformats.org/officeDocument/2006/math" xmlns:a14="http://schemas.microsoft.com/office/drawing/2010/main" xmlns:ma14="http://schemas.microsoft.com/office/mac/drawingml/2011/main" val="1"/>
+            </a:ext>
+          </a:extLst>
+        </p:spPr>
+        <p:txBody>
+          <a:bodyPr wrap="none" lIns="19050" tIns="19050" rIns="19050" bIns="19050" anchor="ctr">
+            <a:spAutoFit/>
+          </a:bodyPr>
+          <a:lstStyle/>
+          <a:p>
+            <a:pPr algn="ctr">
+              <a:defRPr sz="3500"/>
+            </a:pPr>
+            <a:r>
+              <a:rPr sz="1313"/>
+              <a:t>Input</a:t>
+            </a:r>
+          </a:p>
+          <a:p>
+            <a:pPr algn="ctr">
+              <a:defRPr sz="3500"/>
+            </a:pPr>
+            <a:r>
+              <a:rPr sz="1313"/>
+              <a:t>(Packets)</a:t>
+            </a:r>
+          </a:p>
+        </p:txBody>
+      </p:sp>
+      <p:sp>
+        <p:nvSpPr>
+          <p:cNvPr id="389" name="Line"/>
+          <p:cNvSpPr/>
+          <p:nvPr/>
+        </p:nvSpPr>
+        <p:spPr>
+          <a:xfrm>
+            <a:off x="1146376" y="1982546"/>
+            <a:ext cx="483624" cy="1"/>
+          </a:xfrm>
+          <a:prstGeom prst="line">
+            <a:avLst/>
+          </a:prstGeom>
+          <a:ln w="101600">
+            <a:solidFill>
+              <a:srgbClr val="000000"/>
+            </a:solidFill>
+            <a:miter lim="400000"/>
+            <a:tailEnd type="triangle"/>
+          </a:ln>
+        </p:spPr>
+        <p:txBody>
+          <a:bodyPr lIns="19050" tIns="19050" rIns="19050" bIns="19050" anchor="ctr"/>
           <a:lstStyle/>
           <a:p>
             <a:pPr algn="ctr"/>
-            <a:r>
-              <a:rPr lang="en-US" dirty="0"/>
-              <a:t>Data Preparation: Features and Labels</a:t>
+            <a:endParaRPr sz="675"/>
+          </a:p>
+        </p:txBody>
+      </p:sp>
+      <p:pic>
+        <p:nvPicPr>
+          <p:cNvPr id="390" name="Image" descr="Image"/>
+          <p:cNvPicPr>
+            <a:picLocks noChangeAspect="1"/>
+          </p:cNvPicPr>
+          <p:nvPr/>
+        </p:nvPicPr>
+        <p:blipFill>
+          <a:blip r:embed="rId4"/>
+          <a:stretch>
+            <a:fillRect/>
+          </a:stretch>
+        </p:blipFill>
+        <p:spPr>
+          <a:xfrm>
+            <a:off x="6557387" y="1677717"/>
+            <a:ext cx="609657" cy="609657"/>
+          </a:xfrm>
+          <a:prstGeom prst="rect">
+            <a:avLst/>
+          </a:prstGeom>
+          <a:ln w="12700">
+            <a:miter lim="400000"/>
+          </a:ln>
+        </p:spPr>
+      </p:pic>
+      <p:pic>
+        <p:nvPicPr>
+          <p:cNvPr id="391" name="Image" descr="Image"/>
+          <p:cNvPicPr>
+            <a:picLocks noChangeAspect="1"/>
+          </p:cNvPicPr>
+          <p:nvPr/>
+        </p:nvPicPr>
+        <p:blipFill>
+          <a:blip r:embed="rId5"/>
+          <a:stretch>
+            <a:fillRect/>
+          </a:stretch>
+        </p:blipFill>
+        <p:spPr>
+          <a:xfrm>
+            <a:off x="8004094" y="1677717"/>
+            <a:ext cx="609657" cy="609657"/>
+          </a:xfrm>
+          <a:prstGeom prst="rect">
+            <a:avLst/>
+          </a:prstGeom>
+          <a:ln w="12700">
+            <a:miter lim="400000"/>
+          </a:ln>
+        </p:spPr>
+      </p:pic>
+      <p:sp>
+        <p:nvSpPr>
+          <p:cNvPr id="392" name="Line"/>
+          <p:cNvSpPr/>
+          <p:nvPr/>
+        </p:nvSpPr>
+        <p:spPr>
+          <a:xfrm>
+            <a:off x="7345986" y="1982546"/>
+            <a:ext cx="479167" cy="1"/>
+          </a:xfrm>
+          <a:prstGeom prst="line">
+            <a:avLst/>
+          </a:prstGeom>
+          <a:ln w="101600">
+            <a:solidFill>
+              <a:srgbClr val="000000"/>
+            </a:solidFill>
+            <a:miter lim="400000"/>
+            <a:tailEnd type="triangle"/>
+          </a:ln>
+        </p:spPr>
+        <p:txBody>
+          <a:bodyPr lIns="19050" tIns="19050" rIns="19050" bIns="19050" anchor="ctr"/>
+          <a:lstStyle/>
+          <a:p>
+            <a:pPr algn="ctr"/>
+            <a:endParaRPr sz="675"/>
+          </a:p>
+        </p:txBody>
+      </p:sp>
+      <p:sp>
+        <p:nvSpPr>
+          <p:cNvPr id="393" name="Model…"/>
+          <p:cNvSpPr txBox="1"/>
+          <p:nvPr/>
+        </p:nvSpPr>
+        <p:spPr>
+          <a:xfrm>
+            <a:off x="6473032" y="2342924"/>
+            <a:ext cx="577595" cy="442557"/>
+          </a:xfrm>
+          <a:prstGeom prst="rect">
+            <a:avLst/>
+          </a:prstGeom>
+          <a:ln w="12700">
+            <a:miter lim="400000"/>
+          </a:ln>
+          <a:extLst>
+            <a:ext uri="{C572A759-6A51-4108-AA02-DFA0A04FC94B}">
+              <ma14:wrappingTextBoxFlag xmlns="" xmlns:m="http://schemas.openxmlformats.org/officeDocument/2006/math" xmlns:a14="http://schemas.microsoft.com/office/drawing/2010/main" xmlns:ma14="http://schemas.microsoft.com/office/mac/drawingml/2011/main" val="1"/>
+            </a:ext>
+          </a:extLst>
+        </p:spPr>
+        <p:txBody>
+          <a:bodyPr wrap="none" lIns="19050" tIns="19050" rIns="19050" bIns="19050" anchor="ctr">
+            <a:spAutoFit/>
+          </a:bodyPr>
+          <a:lstStyle/>
+          <a:p>
+            <a:pPr algn="ctr">
+              <a:defRPr sz="3500"/>
+            </a:pPr>
+            <a:r>
+              <a:rPr sz="1313"/>
+              <a:t>Model </a:t>
+            </a:r>
+          </a:p>
+          <a:p>
+            <a:pPr algn="ctr">
+              <a:defRPr sz="3500"/>
+            </a:pPr>
+            <a:r>
+              <a:rPr sz="1313"/>
+              <a:t>Training</a:t>
+            </a:r>
+          </a:p>
+        </p:txBody>
+      </p:sp>
+      <p:sp>
+        <p:nvSpPr>
+          <p:cNvPr id="394" name="Output…"/>
+          <p:cNvSpPr txBox="1"/>
+          <p:nvPr/>
+        </p:nvSpPr>
+        <p:spPr>
+          <a:xfrm>
+            <a:off x="7602849" y="2342924"/>
+            <a:ext cx="1127425" cy="442557"/>
+          </a:xfrm>
+          <a:prstGeom prst="rect">
+            <a:avLst/>
+          </a:prstGeom>
+          <a:ln w="12700">
+            <a:miter lim="400000"/>
+          </a:ln>
+          <a:extLst>
+            <a:ext uri="{C572A759-6A51-4108-AA02-DFA0A04FC94B}">
+              <ma14:wrappingTextBoxFlag xmlns="" xmlns:m="http://schemas.openxmlformats.org/officeDocument/2006/math" xmlns:a14="http://schemas.microsoft.com/office/drawing/2010/main" xmlns:ma14="http://schemas.microsoft.com/office/mac/drawingml/2011/main" val="1"/>
+            </a:ext>
+          </a:extLst>
+        </p:spPr>
+        <p:txBody>
+          <a:bodyPr wrap="none" lIns="19050" tIns="19050" rIns="19050" bIns="19050" anchor="ctr">
+            <a:spAutoFit/>
+          </a:bodyPr>
+          <a:lstStyle/>
+          <a:p>
+            <a:pPr algn="ctr">
+              <a:defRPr sz="3500"/>
+            </a:pPr>
+            <a:r>
+              <a:rPr sz="1313"/>
+              <a:t>Output</a:t>
+            </a:r>
+          </a:p>
+          <a:p>
+            <a:pPr algn="ctr">
+              <a:defRPr sz="3500"/>
+            </a:pPr>
+            <a:r>
+              <a:rPr sz="1313"/>
+              <a:t>(Trained Model)</a:t>
+            </a:r>
+          </a:p>
+        </p:txBody>
+      </p:sp>
+      <p:sp>
+        <p:nvSpPr>
+          <p:cNvPr id="395" name="Line"/>
+          <p:cNvSpPr/>
+          <p:nvPr/>
+        </p:nvSpPr>
+        <p:spPr>
+          <a:xfrm>
+            <a:off x="6862216" y="1370899"/>
+            <a:ext cx="1" cy="276226"/>
+          </a:xfrm>
+          <a:prstGeom prst="line">
+            <a:avLst/>
+          </a:prstGeom>
+          <a:ln w="101600">
+            <a:solidFill>
+              <a:srgbClr val="000000"/>
+            </a:solidFill>
+            <a:miter lim="400000"/>
+            <a:tailEnd type="triangle"/>
+          </a:ln>
+        </p:spPr>
+        <p:txBody>
+          <a:bodyPr lIns="19050" tIns="19050" rIns="19050" bIns="19050" anchor="ctr"/>
+          <a:lstStyle/>
+          <a:p>
+            <a:pPr algn="ctr"/>
+            <a:endParaRPr sz="675"/>
+          </a:p>
+        </p:txBody>
+      </p:sp>
+      <p:sp>
+        <p:nvSpPr>
+          <p:cNvPr id="396" name="Labels"/>
+          <p:cNvSpPr txBox="1"/>
+          <p:nvPr/>
+        </p:nvSpPr>
+        <p:spPr>
+          <a:xfrm>
+            <a:off x="6567293" y="1124799"/>
+            <a:ext cx="476092" cy="240515"/>
+          </a:xfrm>
+          <a:prstGeom prst="rect">
+            <a:avLst/>
+          </a:prstGeom>
+          <a:ln w="12700">
+            <a:miter lim="400000"/>
+          </a:ln>
+          <a:extLst>
+            <a:ext uri="{C572A759-6A51-4108-AA02-DFA0A04FC94B}">
+              <ma14:wrappingTextBoxFlag xmlns="" xmlns:m="http://schemas.openxmlformats.org/officeDocument/2006/math" xmlns:a14="http://schemas.microsoft.com/office/drawing/2010/main" xmlns:ma14="http://schemas.microsoft.com/office/mac/drawingml/2011/main" val="1"/>
+            </a:ext>
+          </a:extLst>
+        </p:spPr>
+        <p:txBody>
+          <a:bodyPr wrap="none" lIns="19050" tIns="19050" rIns="19050" bIns="19050" anchor="ctr">
+            <a:spAutoFit/>
+          </a:bodyPr>
+          <a:lstStyle>
+            <a:lvl1pPr>
+              <a:defRPr sz="3500"/>
+            </a:lvl1pPr>
+          </a:lstStyle>
+          <a:p>
+            <a:pPr algn="ctr"/>
+            <a:r>
+              <a:rPr sz="1313" b="1" dirty="0">
+                <a:solidFill>
+                  <a:srgbClr val="C00000"/>
+                </a:solidFill>
+              </a:rPr>
+              <a:t>Labels</a:t>
+            </a:r>
+          </a:p>
+        </p:txBody>
+      </p:sp>
+      <p:pic>
+        <p:nvPicPr>
+          <p:cNvPr id="397" name="Image" descr="Image"/>
+          <p:cNvPicPr>
+            <a:picLocks noChangeAspect="1"/>
+          </p:cNvPicPr>
+          <p:nvPr/>
+        </p:nvPicPr>
+        <p:blipFill>
+          <a:blip r:embed="rId6"/>
+          <a:stretch>
+            <a:fillRect/>
+          </a:stretch>
+        </p:blipFill>
+        <p:spPr>
+          <a:xfrm>
+            <a:off x="3255647" y="1677717"/>
+            <a:ext cx="609657" cy="609657"/>
+          </a:xfrm>
+          <a:prstGeom prst="rect">
+            <a:avLst/>
+          </a:prstGeom>
+          <a:ln w="12700">
+            <a:miter lim="400000"/>
+          </a:ln>
+        </p:spPr>
+      </p:pic>
+      <p:sp>
+        <p:nvSpPr>
+          <p:cNvPr id="398" name="Line"/>
+          <p:cNvSpPr/>
+          <p:nvPr/>
+        </p:nvSpPr>
+        <p:spPr>
+          <a:xfrm>
+            <a:off x="5899280" y="1982546"/>
+            <a:ext cx="479167" cy="1"/>
+          </a:xfrm>
+          <a:prstGeom prst="line">
+            <a:avLst/>
+          </a:prstGeom>
+          <a:ln w="101600">
+            <a:solidFill>
+              <a:srgbClr val="000000"/>
+            </a:solidFill>
+            <a:miter lim="400000"/>
+            <a:tailEnd type="triangle"/>
+          </a:ln>
+        </p:spPr>
+        <p:txBody>
+          <a:bodyPr lIns="19050" tIns="19050" rIns="19050" bIns="19050" anchor="ctr"/>
+          <a:lstStyle/>
+          <a:p>
+            <a:pPr algn="ctr"/>
+            <a:endParaRPr sz="675"/>
+          </a:p>
+        </p:txBody>
+      </p:sp>
+      <p:sp>
+        <p:nvSpPr>
+          <p:cNvPr id="399" name="Data…"/>
+          <p:cNvSpPr txBox="1"/>
+          <p:nvPr/>
+        </p:nvSpPr>
+        <p:spPr>
+          <a:xfrm>
+            <a:off x="2899362" y="2342924"/>
+            <a:ext cx="1078117" cy="442557"/>
+          </a:xfrm>
+          <a:prstGeom prst="rect">
+            <a:avLst/>
+          </a:prstGeom>
+          <a:ln w="12700">
+            <a:miter lim="400000"/>
+          </a:ln>
+          <a:extLst>
+            <a:ext uri="{C572A759-6A51-4108-AA02-DFA0A04FC94B}">
+              <ma14:wrappingTextBoxFlag xmlns="" xmlns:m="http://schemas.openxmlformats.org/officeDocument/2006/math" xmlns:a14="http://schemas.microsoft.com/office/drawing/2010/main" xmlns:ma14="http://schemas.microsoft.com/office/mac/drawingml/2011/main" val="1"/>
+            </a:ext>
+          </a:extLst>
+        </p:spPr>
+        <p:txBody>
+          <a:bodyPr wrap="none" lIns="19050" tIns="19050" rIns="19050" bIns="19050" anchor="ctr">
+            <a:spAutoFit/>
+          </a:bodyPr>
+          <a:lstStyle/>
+          <a:p>
+            <a:pPr algn="ctr">
+              <a:defRPr sz="3500"/>
+            </a:pPr>
+            <a:r>
+              <a:rPr sz="1313"/>
+              <a:t>Data </a:t>
+            </a:r>
+          </a:p>
+          <a:p>
+            <a:pPr algn="ctr">
+              <a:defRPr sz="3500"/>
+            </a:pPr>
+            <a:r>
+              <a:rPr sz="1313"/>
+              <a:t>Representation</a:t>
+            </a:r>
+          </a:p>
+        </p:txBody>
+      </p:sp>
+      <p:pic>
+        <p:nvPicPr>
+          <p:cNvPr id="400" name="Image" descr="Image"/>
+          <p:cNvPicPr>
+            <a:picLocks noChangeAspect="1"/>
+          </p:cNvPicPr>
+          <p:nvPr/>
+        </p:nvPicPr>
+        <p:blipFill>
+          <a:blip r:embed="rId7"/>
+          <a:stretch>
+            <a:fillRect/>
+          </a:stretch>
+        </p:blipFill>
+        <p:spPr>
+          <a:xfrm>
+            <a:off x="1808942" y="1677717"/>
+            <a:ext cx="609657" cy="609657"/>
+          </a:xfrm>
+          <a:prstGeom prst="rect">
+            <a:avLst/>
+          </a:prstGeom>
+          <a:ln w="12700">
+            <a:miter lim="400000"/>
+          </a:ln>
+        </p:spPr>
+      </p:pic>
+      <p:sp>
+        <p:nvSpPr>
+          <p:cNvPr id="401" name="Packet…"/>
+          <p:cNvSpPr txBox="1"/>
+          <p:nvPr/>
+        </p:nvSpPr>
+        <p:spPr>
+          <a:xfrm>
+            <a:off x="1419390" y="2342924"/>
+            <a:ext cx="1077539" cy="442557"/>
+          </a:xfrm>
+          <a:prstGeom prst="rect">
+            <a:avLst/>
+          </a:prstGeom>
+          <a:ln w="12700">
+            <a:miter lim="400000"/>
+          </a:ln>
+          <a:extLst>
+            <a:ext uri="{C572A759-6A51-4108-AA02-DFA0A04FC94B}">
+              <ma14:wrappingTextBoxFlag xmlns="" xmlns:m="http://schemas.openxmlformats.org/officeDocument/2006/math" xmlns:a14="http://schemas.microsoft.com/office/drawing/2010/main" xmlns:ma14="http://schemas.microsoft.com/office/mac/drawingml/2011/main" val="1"/>
+            </a:ext>
+          </a:extLst>
+        </p:spPr>
+        <p:txBody>
+          <a:bodyPr wrap="none" lIns="19050" tIns="19050" rIns="19050" bIns="19050" anchor="ctr">
+            <a:spAutoFit/>
+          </a:bodyPr>
+          <a:lstStyle/>
+          <a:p>
+            <a:pPr algn="ctr">
+              <a:defRPr sz="3500"/>
+            </a:pPr>
+            <a:r>
+              <a:rPr sz="1313"/>
+              <a:t>Packet </a:t>
+            </a:r>
+          </a:p>
+          <a:p>
+            <a:pPr algn="ctr">
+              <a:defRPr sz="3500"/>
+            </a:pPr>
+            <a:r>
+              <a:rPr sz="1313"/>
+              <a:t>Transformation</a:t>
+            </a:r>
+          </a:p>
+        </p:txBody>
+      </p:sp>
+      <p:sp>
+        <p:nvSpPr>
+          <p:cNvPr id="402" name="Line"/>
+          <p:cNvSpPr/>
+          <p:nvPr/>
+        </p:nvSpPr>
+        <p:spPr>
+          <a:xfrm>
+            <a:off x="2597540" y="1982546"/>
+            <a:ext cx="479167" cy="1"/>
+          </a:xfrm>
+          <a:prstGeom prst="line">
+            <a:avLst/>
+          </a:prstGeom>
+          <a:ln w="101600">
+            <a:solidFill>
+              <a:srgbClr val="000000"/>
+            </a:solidFill>
+            <a:miter lim="400000"/>
+            <a:tailEnd type="triangle"/>
+          </a:ln>
+        </p:spPr>
+        <p:txBody>
+          <a:bodyPr lIns="19050" tIns="19050" rIns="19050" bIns="19050" anchor="ctr"/>
+          <a:lstStyle/>
+          <a:p>
+            <a:pPr algn="ctr"/>
+            <a:endParaRPr sz="675"/>
+          </a:p>
+        </p:txBody>
+      </p:sp>
+      <p:sp>
+        <p:nvSpPr>
+          <p:cNvPr id="403" name="Line"/>
+          <p:cNvSpPr/>
+          <p:nvPr/>
+        </p:nvSpPr>
+        <p:spPr>
+          <a:xfrm>
+            <a:off x="4044246" y="1982546"/>
+            <a:ext cx="479167" cy="1"/>
+          </a:xfrm>
+          <a:prstGeom prst="line">
+            <a:avLst/>
+          </a:prstGeom>
+          <a:ln w="101600">
+            <a:solidFill>
+              <a:srgbClr val="000000"/>
+            </a:solidFill>
+            <a:miter lim="400000"/>
+            <a:tailEnd type="triangle"/>
+          </a:ln>
+        </p:spPr>
+        <p:txBody>
+          <a:bodyPr lIns="19050" tIns="19050" rIns="19050" bIns="19050" anchor="ctr"/>
+          <a:lstStyle/>
+          <a:p>
+            <a:pPr algn="ctr"/>
+            <a:endParaRPr sz="675"/>
+          </a:p>
+        </p:txBody>
+      </p:sp>
+      <p:sp>
+        <p:nvSpPr>
+          <p:cNvPr id="404" name="Representation…"/>
+          <p:cNvSpPr txBox="1"/>
+          <p:nvPr/>
+        </p:nvSpPr>
+        <p:spPr>
+          <a:xfrm>
+            <a:off x="4510728" y="1660246"/>
+            <a:ext cx="1116588" cy="644600"/>
+          </a:xfrm>
+          <a:prstGeom prst="rect">
+            <a:avLst/>
+          </a:prstGeom>
+          <a:ln w="12700">
+            <a:miter lim="400000"/>
+          </a:ln>
+          <a:extLst>
+            <a:ext uri="{C572A759-6A51-4108-AA02-DFA0A04FC94B}">
+              <ma14:wrappingTextBoxFlag xmlns="" xmlns:m="http://schemas.openxmlformats.org/officeDocument/2006/math" xmlns:a14="http://schemas.microsoft.com/office/drawing/2010/main" xmlns:ma14="http://schemas.microsoft.com/office/mac/drawingml/2011/main" val="1"/>
+            </a:ext>
+          </a:extLst>
+        </p:spPr>
+        <p:txBody>
+          <a:bodyPr wrap="none" lIns="19050" tIns="19050" rIns="19050" bIns="19050" anchor="ctr">
+            <a:spAutoFit/>
+          </a:bodyPr>
+          <a:lstStyle/>
+          <a:p>
+            <a:pPr algn="ctr">
+              <a:defRPr sz="3500"/>
+            </a:pPr>
+            <a:r>
+              <a:rPr sz="1313" dirty="0"/>
+              <a:t>Representation </a:t>
+            </a:r>
+          </a:p>
+          <a:p>
+            <a:pPr algn="ctr">
+              <a:defRPr sz="3500"/>
+            </a:pPr>
+            <a:r>
+              <a:rPr sz="1313" dirty="0"/>
+              <a:t>Compression</a:t>
+            </a:r>
+          </a:p>
+          <a:p>
+            <a:pPr algn="ctr">
+              <a:defRPr sz="3500"/>
+            </a:pPr>
+            <a:r>
+              <a:rPr sz="1313" dirty="0"/>
+              <a:t>(Optional)</a:t>
             </a:r>
           </a:p>
         </p:txBody>
@@ -5489,7 +6954,7 @@
     </p:spTree>
     <p:extLst>
       <p:ext uri="{BB962C8B-B14F-4D97-AF65-F5344CB8AC3E}">
-        <p14:creationId xmlns:p14="http://schemas.microsoft.com/office/powerpoint/2010/main" val="693527777"/>
+        <p14:creationId xmlns:p14="http://schemas.microsoft.com/office/powerpoint/2010/main" val="3305231753"/>
       </p:ext>
     </p:extLst>
   </p:cSld>
@@ -5518,7 +6983,13 @@
       </p:grpSpPr>
       <p:sp>
         <p:nvSpPr>
-          <p:cNvPr id="3" name="Title 2"/>
+          <p:cNvPr id="2" name="Title 1">
+            <a:extLst>
+              <a:ext uri="{FF2B5EF4-FFF2-40B4-BE49-F238E27FC236}">
+                <a16:creationId xmlns:a16="http://schemas.microsoft.com/office/drawing/2014/main" id="{6FA7F04B-7C0A-9C4A-BB06-32579D454B02}"/>
+              </a:ext>
+            </a:extLst>
+          </p:cNvPr>
           <p:cNvSpPr>
             <a:spLocks noGrp="1"/>
           </p:cNvSpPr>
@@ -5526,81 +6997,28 @@
             <p:ph type="title"/>
           </p:nvPr>
         </p:nvSpPr>
-        <p:spPr/>
+        <p:spPr>
+          <a:xfrm>
+            <a:off x="628650" y="1385039"/>
+            <a:ext cx="7886700" cy="994172"/>
+          </a:xfrm>
+        </p:spPr>
         <p:txBody>
           <a:bodyPr/>
           <a:lstStyle/>
           <a:p>
-            <a:r>
-              <a:rPr lang="en-US" dirty="0">
-                <a:solidFill>
-                  <a:schemeClr val="tx1"/>
-                </a:solidFill>
-              </a:rPr>
-              <a:t>Features: What and Why?</a:t>
-            </a:r>
-          </a:p>
-        </p:txBody>
-      </p:sp>
-      <p:sp>
-        <p:nvSpPr>
-          <p:cNvPr id="2" name="Content Placeholder 1"/>
-          <p:cNvSpPr>
-            <a:spLocks noGrp="1"/>
-          </p:cNvSpPr>
-          <p:nvPr>
-            <p:ph idx="1"/>
-          </p:nvPr>
-        </p:nvSpPr>
-        <p:spPr/>
-        <p:txBody>
-          <a:bodyPr>
-            <a:normAutofit/>
-          </a:bodyPr>
-          <a:lstStyle/>
-          <a:p>
+            <a:pPr algn="ctr"/>
             <a:r>
               <a:rPr lang="en-US" dirty="0"/>
-              <a:t>Features are hints/rules of thumb you give your model</a:t>
-            </a:r>
-          </a:p>
-          <a:p>
-            <a:pPr lvl="1"/>
-            <a:r>
-              <a:rPr lang="en-US" sz="2100" dirty="0"/>
-              <a:t>Encoding domain knowledge for the model to use</a:t>
-            </a:r>
-          </a:p>
-          <a:p>
-            <a:endParaRPr lang="en-US" dirty="0"/>
-          </a:p>
-          <a:p>
-            <a:r>
-              <a:rPr lang="en-US" dirty="0"/>
-              <a:t>Feature generation is one of the most important part of the machine learning modeling process.</a:t>
-            </a:r>
-          </a:p>
-          <a:p>
-            <a:endParaRPr lang="en-US" dirty="0"/>
-          </a:p>
-          <a:p>
-            <a:r>
-              <a:rPr lang="en-US" dirty="0"/>
-              <a:t>Complexity in features may allow us to use less complex models that are faster to run, easier to understand and easier to maintain.</a:t>
-            </a:r>
-          </a:p>
-          <a:p>
-            <a:endParaRPr lang="en-US" dirty="0"/>
-          </a:p>
-          <a:p>
-            <a:endParaRPr lang="en-US" dirty="0"/>
+              <a:t>Data Preparation: Features and Labels</a:t>
+            </a:r>
           </a:p>
         </p:txBody>
       </p:sp>
     </p:spTree>
     <p:extLst>
       <p:ext uri="{BB962C8B-B14F-4D97-AF65-F5344CB8AC3E}">
-        <p14:creationId xmlns:p14="http://schemas.microsoft.com/office/powerpoint/2010/main" val="837826461"/>
+        <p14:creationId xmlns:p14="http://schemas.microsoft.com/office/powerpoint/2010/main" val="693527777"/>
       </p:ext>
     </p:extLst>
   </p:cSld>
@@ -5611,6 +7029,573 @@
 </file>
 
 <file path=ppt/slides/slide4.xml><?xml version="1.0" encoding="utf-8"?>
+<p:sld xmlns:a="http://schemas.openxmlformats.org/drawingml/2006/main" xmlns:r="http://schemas.openxmlformats.org/officeDocument/2006/relationships" xmlns:p="http://schemas.openxmlformats.org/presentationml/2006/main">
+  <p:cSld>
+    <p:spTree>
+      <p:nvGrpSpPr>
+        <p:cNvPr id="1" name="Shape 183"/>
+        <p:cNvGrpSpPr/>
+        <p:nvPr/>
+      </p:nvGrpSpPr>
+      <p:grpSpPr>
+        <a:xfrm>
+          <a:off x="0" y="0"/>
+          <a:ext cx="0" cy="0"/>
+          <a:chOff x="0" y="0"/>
+          <a:chExt cx="0" cy="0"/>
+        </a:xfrm>
+      </p:grpSpPr>
+      <p:sp>
+        <p:nvSpPr>
+          <p:cNvPr id="184" name="Google Shape;184;p22"/>
+          <p:cNvSpPr txBox="1">
+            <a:spLocks noGrp="1"/>
+          </p:cNvSpPr>
+          <p:nvPr>
+            <p:ph type="title"/>
+          </p:nvPr>
+        </p:nvSpPr>
+        <p:spPr>
+          <a:xfrm>
+            <a:off x="628649" y="205741"/>
+            <a:ext cx="7886700" cy="788432"/>
+          </a:xfrm>
+          <a:prstGeom prst="rect">
+            <a:avLst/>
+          </a:prstGeom>
+        </p:spPr>
+        <p:txBody>
+          <a:bodyPr spcFirstLastPara="1" vert="horz" wrap="square" lIns="91425" tIns="91425" rIns="91425" bIns="91425" numCol="1" rtlCol="0" anchor="t" anchorCtr="0" compatLnSpc="1">
+            <a:prstTxWarp prst="textNoShape">
+              <a:avLst/>
+            </a:prstTxWarp>
+            <a:noAutofit/>
+          </a:bodyPr>
+          <a:lstStyle/>
+          <a:p>
+            <a:r>
+              <a:rPr lang="en" dirty="0"/>
+              <a:t>Modeling: Data Representation</a:t>
+            </a:r>
+            <a:endParaRPr dirty="0"/>
+          </a:p>
+        </p:txBody>
+      </p:sp>
+      <p:sp>
+        <p:nvSpPr>
+          <p:cNvPr id="185" name="Google Shape;185;p22"/>
+          <p:cNvSpPr txBox="1">
+            <a:spLocks noGrp="1"/>
+          </p:cNvSpPr>
+          <p:nvPr>
+            <p:ph idx="1"/>
+          </p:nvPr>
+        </p:nvSpPr>
+        <p:spPr>
+          <a:xfrm>
+            <a:off x="412650" y="899499"/>
+            <a:ext cx="8454150" cy="4244002"/>
+          </a:xfrm>
+          <a:prstGeom prst="rect">
+            <a:avLst/>
+          </a:prstGeom>
+        </p:spPr>
+        <p:txBody>
+          <a:bodyPr spcFirstLastPara="1" vert="horz" wrap="square" lIns="91425" tIns="91425" rIns="91425" bIns="91425" numCol="1" rtlCol="0" anchor="t" anchorCtr="0" compatLnSpc="1">
+            <a:prstTxWarp prst="textNoShape">
+              <a:avLst/>
+            </a:prstTxWarp>
+            <a:noAutofit/>
+          </a:bodyPr>
+          <a:lstStyle/>
+          <a:p>
+            <a:pPr marL="506241" indent="-317492"/>
+            <a:r>
+              <a:rPr lang="en" sz="1800" dirty="0"/>
+              <a:t>We aim for general representations, with </a:t>
+            </a:r>
+            <a:r>
+              <a:rPr lang="en" sz="1800" b="1" dirty="0">
+                <a:solidFill>
+                  <a:srgbClr val="C00000"/>
+                </a:solidFill>
+              </a:rPr>
+              <a:t>consideration of cost/complexity </a:t>
+            </a:r>
+            <a:r>
+              <a:rPr lang="en" sz="1800" dirty="0"/>
+              <a:t>as part of the optimization.</a:t>
+            </a:r>
+          </a:p>
+          <a:p>
+            <a:pPr marL="457189" indent="-342892"/>
+            <a:r>
+              <a:rPr lang="en" sz="1800" dirty="0"/>
+              <a:t>Many </a:t>
+            </a:r>
+            <a:r>
+              <a:rPr lang="en" sz="1800" b="1" dirty="0">
+                <a:solidFill>
+                  <a:srgbClr val="C00000"/>
+                </a:solidFill>
+              </a:rPr>
+              <a:t>challenges</a:t>
+            </a:r>
+            <a:r>
+              <a:rPr lang="en" sz="1800" dirty="0"/>
+              <a:t> for representing the data</a:t>
+            </a:r>
+            <a:endParaRPr sz="1800" dirty="0"/>
+          </a:p>
+          <a:p>
+            <a:pPr marL="914378" lvl="1" indent="-317492">
+              <a:spcBef>
+                <a:spcPts val="0"/>
+              </a:spcBef>
+            </a:pPr>
+            <a:r>
+              <a:rPr lang="en" dirty="0"/>
+              <a:t>Scale (constantly generated)</a:t>
+            </a:r>
+          </a:p>
+          <a:p>
+            <a:pPr marL="914378" lvl="1" indent="-317492">
+              <a:spcBef>
+                <a:spcPts val="0"/>
+              </a:spcBef>
+            </a:pPr>
+            <a:r>
+              <a:rPr lang="en" dirty="0"/>
+              <a:t>Sequential dependencies (handshakes, parameter negotiation)</a:t>
+            </a:r>
+            <a:endParaRPr dirty="0"/>
+          </a:p>
+          <a:p>
+            <a:pPr marL="914378" lvl="1" indent="-317492">
+              <a:spcBef>
+                <a:spcPts val="0"/>
+              </a:spcBef>
+            </a:pPr>
+            <a:r>
+              <a:rPr lang="en-US" dirty="0"/>
+              <a:t>Non-uniform timeseries (network traffic is “</a:t>
+            </a:r>
+            <a:r>
+              <a:rPr lang="en-US" dirty="0" err="1"/>
+              <a:t>bursty</a:t>
+            </a:r>
+            <a:r>
+              <a:rPr lang="en-US" dirty="0"/>
+              <a:t>”)</a:t>
+            </a:r>
+          </a:p>
+          <a:p>
+            <a:pPr marL="914378" lvl="1" indent="-317492">
+              <a:spcBef>
+                <a:spcPts val="0"/>
+              </a:spcBef>
+            </a:pPr>
+            <a:r>
+              <a:rPr lang="en" dirty="0"/>
+              <a:t>Cross-flow dependencies (applications don’t use one flow)</a:t>
+            </a:r>
+            <a:endParaRPr dirty="0"/>
+          </a:p>
+          <a:p>
+            <a:pPr marL="457189" indent="-342892"/>
+            <a:r>
+              <a:rPr lang="en" sz="1800" dirty="0"/>
+              <a:t>Many </a:t>
+            </a:r>
+            <a:r>
+              <a:rPr lang="en" sz="1800" b="1" dirty="0">
+                <a:solidFill>
+                  <a:srgbClr val="C00000"/>
+                </a:solidFill>
+              </a:rPr>
+              <a:t>choices</a:t>
+            </a:r>
+            <a:r>
+              <a:rPr lang="en" sz="1800" dirty="0"/>
+              <a:t> for representing traffic data, with different </a:t>
+            </a:r>
+            <a:r>
+              <a:rPr lang="en" sz="1800" b="1" dirty="0">
+                <a:solidFill>
+                  <a:srgbClr val="C00000"/>
+                </a:solidFill>
+              </a:rPr>
+              <a:t>costs</a:t>
+            </a:r>
+            <a:r>
+              <a:rPr lang="en" sz="1800" b="1" dirty="0"/>
+              <a:t>.</a:t>
+            </a:r>
+            <a:endParaRPr lang="en" sz="1800" dirty="0"/>
+          </a:p>
+          <a:p>
+            <a:pPr marL="914378" lvl="1" indent="-317492">
+              <a:spcBef>
+                <a:spcPts val="0"/>
+              </a:spcBef>
+            </a:pPr>
+            <a:r>
+              <a:rPr lang="en-US" b="1" dirty="0">
+                <a:solidFill>
+                  <a:srgbClr val="C00000"/>
+                </a:solidFill>
+              </a:rPr>
+              <a:t>Packet: </a:t>
+            </a:r>
+            <a:r>
+              <a:rPr lang="en-US" dirty="0">
+                <a:solidFill>
+                  <a:srgbClr val="C00000"/>
+                </a:solidFill>
+              </a:rPr>
+              <a:t>Each packet is raw input to the model.</a:t>
+            </a:r>
+            <a:endParaRPr lang="en-US" b="1" dirty="0">
+              <a:solidFill>
+                <a:srgbClr val="C00000"/>
+              </a:solidFill>
+            </a:endParaRPr>
+          </a:p>
+          <a:p>
+            <a:pPr marL="914378" lvl="1" indent="-317492">
+              <a:spcBef>
+                <a:spcPts val="0"/>
+              </a:spcBef>
+            </a:pPr>
+            <a:r>
+              <a:rPr lang="en" b="1" dirty="0"/>
+              <a:t>Event:</a:t>
+            </a:r>
+            <a:r>
+              <a:rPr lang="en" dirty="0"/>
+              <a:t> Each “traffic event” is a data point (e.g., spike in traffic). (Could also sub-select on only anomalous events, such as deviation from moving average.)</a:t>
+            </a:r>
+            <a:endParaRPr dirty="0"/>
+          </a:p>
+          <a:p>
+            <a:pPr marL="914378" lvl="1" indent="-317492">
+              <a:spcBef>
+                <a:spcPts val="0"/>
+              </a:spcBef>
+            </a:pPr>
+            <a:r>
+              <a:rPr lang="en" b="1" dirty="0"/>
+              <a:t>Time: </a:t>
+            </a:r>
+            <a:r>
+              <a:rPr lang="en" dirty="0"/>
+              <a:t>Traffic statistics are grouped/binned in time (challenge: bin size)</a:t>
+            </a:r>
+            <a:endParaRPr dirty="0"/>
+          </a:p>
+          <a:p>
+            <a:pPr marL="914378" lvl="1" indent="-317492">
+              <a:spcBef>
+                <a:spcPts val="0"/>
+              </a:spcBef>
+            </a:pPr>
+            <a:r>
+              <a:rPr lang="en" b="1" dirty="0"/>
+              <a:t>Volume: </a:t>
+            </a:r>
+            <a:r>
+              <a:rPr lang="en" dirty="0"/>
+              <a:t>Bins based on volume (non-uniform intervals). (Standardizes events.)</a:t>
+            </a:r>
+          </a:p>
+          <a:p>
+            <a:pPr marL="0" indent="0">
+              <a:spcBef>
+                <a:spcPts val="1600"/>
+              </a:spcBef>
+              <a:spcAft>
+                <a:spcPts val="1600"/>
+              </a:spcAft>
+              <a:buNone/>
+            </a:pPr>
+            <a:endParaRPr sz="1800" dirty="0"/>
+          </a:p>
+        </p:txBody>
+      </p:sp>
+    </p:spTree>
+    <p:extLst>
+      <p:ext uri="{BB962C8B-B14F-4D97-AF65-F5344CB8AC3E}">
+        <p14:creationId xmlns:p14="http://schemas.microsoft.com/office/powerpoint/2010/main" val="669658563"/>
+      </p:ext>
+    </p:extLst>
+  </p:cSld>
+  <p:clrMapOvr>
+    <a:masterClrMapping/>
+  </p:clrMapOvr>
+</p:sld>
+</file>
+
+<file path=ppt/slides/slide5.xml><?xml version="1.0" encoding="utf-8"?>
+<p:sld xmlns:a="http://schemas.openxmlformats.org/drawingml/2006/main" xmlns:r="http://schemas.openxmlformats.org/officeDocument/2006/relationships" xmlns:p="http://schemas.openxmlformats.org/presentationml/2006/main">
+  <p:cSld>
+    <p:spTree>
+      <p:nvGrpSpPr>
+        <p:cNvPr id="1" name="Shape 189"/>
+        <p:cNvGrpSpPr/>
+        <p:nvPr/>
+      </p:nvGrpSpPr>
+      <p:grpSpPr>
+        <a:xfrm>
+          <a:off x="0" y="0"/>
+          <a:ext cx="0" cy="0"/>
+          <a:chOff x="0" y="0"/>
+          <a:chExt cx="0" cy="0"/>
+        </a:xfrm>
+      </p:grpSpPr>
+      <p:sp>
+        <p:nvSpPr>
+          <p:cNvPr id="190" name="Google Shape;190;p23"/>
+          <p:cNvSpPr txBox="1">
+            <a:spLocks noGrp="1"/>
+          </p:cNvSpPr>
+          <p:nvPr>
+            <p:ph type="title"/>
+          </p:nvPr>
+        </p:nvSpPr>
+        <p:spPr>
+          <a:xfrm>
+            <a:off x="572989" y="79970"/>
+            <a:ext cx="7886700" cy="739274"/>
+          </a:xfrm>
+          <a:prstGeom prst="rect">
+            <a:avLst/>
+          </a:prstGeom>
+        </p:spPr>
+        <p:txBody>
+          <a:bodyPr spcFirstLastPara="1" vert="horz" wrap="square" lIns="91425" tIns="91425" rIns="91425" bIns="91425" numCol="1" rtlCol="0" anchor="t" anchorCtr="0" compatLnSpc="1">
+            <a:prstTxWarp prst="textNoShape">
+              <a:avLst/>
+            </a:prstTxWarp>
+            <a:noAutofit/>
+          </a:bodyPr>
+          <a:lstStyle/>
+          <a:p>
+            <a:r>
+              <a:rPr lang="en" dirty="0"/>
+              <a:t>(Looking Ahead) </a:t>
+            </a:r>
+            <a:br>
+              <a:rPr lang="en" dirty="0"/>
+            </a:br>
+            <a:r>
+              <a:rPr lang="en" dirty="0"/>
+              <a:t>Modeling: Model Selection</a:t>
+            </a:r>
+            <a:endParaRPr dirty="0"/>
+          </a:p>
+        </p:txBody>
+      </p:sp>
+      <p:sp>
+        <p:nvSpPr>
+          <p:cNvPr id="191" name="Google Shape;191;p23"/>
+          <p:cNvSpPr txBox="1">
+            <a:spLocks noGrp="1"/>
+          </p:cNvSpPr>
+          <p:nvPr>
+            <p:ph idx="1"/>
+          </p:nvPr>
+        </p:nvSpPr>
+        <p:spPr>
+          <a:xfrm>
+            <a:off x="408510" y="939998"/>
+            <a:ext cx="8499436" cy="3263504"/>
+          </a:xfrm>
+          <a:prstGeom prst="rect">
+            <a:avLst/>
+          </a:prstGeom>
+        </p:spPr>
+        <p:txBody>
+          <a:bodyPr spcFirstLastPara="1" vert="horz" wrap="square" lIns="91425" tIns="91425" rIns="91425" bIns="91425" numCol="1" rtlCol="0" anchor="t" anchorCtr="0" compatLnSpc="1">
+            <a:prstTxWarp prst="textNoShape">
+              <a:avLst/>
+            </a:prstTxWarp>
+            <a:noAutofit/>
+          </a:bodyPr>
+          <a:lstStyle/>
+          <a:p>
+            <a:pPr marL="457189" indent="-342892"/>
+            <a:r>
+              <a:rPr lang="en-US" sz="2400" dirty="0"/>
+              <a:t>Consider problems with different levels of </a:t>
+            </a:r>
+            <a:r>
+              <a:rPr lang="en-US" sz="2400" b="1" dirty="0">
+                <a:solidFill>
+                  <a:srgbClr val="C00000"/>
+                </a:solidFill>
+              </a:rPr>
+              <a:t>complexity</a:t>
+            </a:r>
+            <a:r>
+              <a:rPr lang="en-US" sz="2400" dirty="0"/>
+              <a:t>.</a:t>
+            </a:r>
+            <a:endParaRPr lang="en-US" sz="1800" dirty="0"/>
+          </a:p>
+          <a:p>
+            <a:pPr marL="457189" indent="-342892"/>
+            <a:r>
+              <a:rPr lang="en" sz="2400" b="1" dirty="0">
+                <a:solidFill>
+                  <a:srgbClr val="C00000"/>
+                </a:solidFill>
+              </a:rPr>
+              <a:t>Simple Detectors: </a:t>
+            </a:r>
+            <a:r>
+              <a:rPr lang="en" sz="2400" dirty="0"/>
+              <a:t>Non-Temporal Models</a:t>
+            </a:r>
+            <a:endParaRPr sz="2400" dirty="0"/>
+          </a:p>
+          <a:p>
+            <a:pPr marL="914378" lvl="1" indent="-317492">
+              <a:spcBef>
+                <a:spcPts val="0"/>
+              </a:spcBef>
+            </a:pPr>
+            <a:r>
+              <a:rPr lang="en" b="1" dirty="0">
+                <a:solidFill>
+                  <a:srgbClr val="C00000"/>
+                </a:solidFill>
+              </a:rPr>
+              <a:t>Random forest</a:t>
+            </a:r>
+            <a:r>
+              <a:rPr lang="en" dirty="0"/>
+              <a:t>, SVM</a:t>
+            </a:r>
+          </a:p>
+          <a:p>
+            <a:pPr marL="914378" lvl="1" indent="-317492">
+              <a:spcBef>
+                <a:spcPts val="0"/>
+              </a:spcBef>
+            </a:pPr>
+            <a:r>
+              <a:rPr lang="en" b="1" dirty="0">
+                <a:solidFill>
+                  <a:srgbClr val="C00000"/>
+                </a:solidFill>
+              </a:rPr>
+              <a:t>Convolutional Neural Network</a:t>
+            </a:r>
+            <a:endParaRPr b="1" dirty="0">
+              <a:solidFill>
+                <a:srgbClr val="C00000"/>
+              </a:solidFill>
+            </a:endParaRPr>
+          </a:p>
+          <a:p>
+            <a:pPr marL="914378" lvl="1" indent="-317492">
+              <a:spcBef>
+                <a:spcPts val="0"/>
+              </a:spcBef>
+            </a:pPr>
+            <a:r>
+              <a:rPr lang="en" dirty="0"/>
+              <a:t>Work on some representations (volume based)</a:t>
+            </a:r>
+            <a:endParaRPr dirty="0"/>
+          </a:p>
+          <a:p>
+            <a:pPr marL="914378" lvl="1" indent="-317492">
+              <a:spcBef>
+                <a:spcPts val="0"/>
+              </a:spcBef>
+            </a:pPr>
+            <a:r>
+              <a:rPr lang="en" dirty="0"/>
+              <a:t>Challenge: </a:t>
+            </a:r>
+            <a:r>
+              <a:rPr lang="en" b="1" dirty="0"/>
+              <a:t>Do not capture temporal features</a:t>
+            </a:r>
+            <a:endParaRPr dirty="0"/>
+          </a:p>
+          <a:p>
+            <a:pPr marL="457189" indent="-342892"/>
+            <a:r>
+              <a:rPr lang="en-US" sz="2400" b="1" dirty="0">
+                <a:solidFill>
+                  <a:srgbClr val="C00000"/>
+                </a:solidFill>
+              </a:rPr>
+              <a:t>More Complex Detectors:</a:t>
+            </a:r>
+            <a:r>
+              <a:rPr lang="en-US" sz="2400" dirty="0"/>
+              <a:t> Temporal Models</a:t>
+            </a:r>
+            <a:endParaRPr sz="2400" dirty="0"/>
+          </a:p>
+          <a:p>
+            <a:pPr marL="914378" lvl="1" indent="-317492">
+              <a:spcBef>
+                <a:spcPts val="0"/>
+              </a:spcBef>
+            </a:pPr>
+            <a:r>
+              <a:rPr lang="en" dirty="0"/>
+              <a:t>Long Short-Term Memory (LSTM), Gated Recurrent Units (GRU)</a:t>
+            </a:r>
+            <a:endParaRPr dirty="0"/>
+          </a:p>
+          <a:p>
+            <a:pPr marL="914378" lvl="1" indent="-317492">
+              <a:spcBef>
+                <a:spcPts val="0"/>
+              </a:spcBef>
+            </a:pPr>
+            <a:r>
+              <a:rPr lang="en" dirty="0"/>
+              <a:t>Can be used to capture temporal information from the features</a:t>
+            </a:r>
+            <a:br>
+              <a:rPr lang="en" dirty="0"/>
+            </a:br>
+            <a:endParaRPr dirty="0"/>
+          </a:p>
+          <a:p>
+            <a:pPr marL="0" indent="0">
+              <a:spcBef>
+                <a:spcPts val="1600"/>
+              </a:spcBef>
+              <a:spcAft>
+                <a:spcPts val="1600"/>
+              </a:spcAft>
+              <a:buNone/>
+            </a:pPr>
+            <a:endParaRPr sz="2400" dirty="0"/>
+          </a:p>
+        </p:txBody>
+      </p:sp>
+    </p:spTree>
+    <p:extLst>
+      <p:ext uri="{BB962C8B-B14F-4D97-AF65-F5344CB8AC3E}">
+        <p14:creationId xmlns:p14="http://schemas.microsoft.com/office/powerpoint/2010/main" val="3767115798"/>
+      </p:ext>
+    </p:extLst>
+  </p:cSld>
+  <p:clrMapOvr>
+    <a:masterClrMapping/>
+  </p:clrMapOvr>
+</p:sld>
+</file>
+
+<file path=ppt/slides/slide6.xml><?xml version="1.0" encoding="utf-8"?>
 <p:sld xmlns:a="http://schemas.openxmlformats.org/drawingml/2006/main" xmlns:r="http://schemas.openxmlformats.org/officeDocument/2006/relationships" xmlns:p="http://schemas.openxmlformats.org/presentationml/2006/main">
   <p:cSld>
     <p:spTree>
@@ -5648,7 +7633,7 @@
                   <a:schemeClr val="tx1"/>
                 </a:solidFill>
               </a:rPr>
-              <a:t>Generating Features</a:t>
+              <a:t>Features: What and Why?</a:t>
             </a:r>
           </a:p>
         </p:txBody>
@@ -5666,83 +7651,52 @@
         <p:spPr/>
         <p:txBody>
           <a:bodyPr>
-            <a:normAutofit fontScale="92500" lnSpcReduction="20000"/>
+            <a:normAutofit/>
           </a:bodyPr>
           <a:lstStyle/>
           <a:p>
             <a:r>
               <a:rPr lang="en-US" dirty="0"/>
-              <a:t>Categorical to Binary (Dummies)</a:t>
-            </a:r>
+              <a:t>Features are hints/rules of thumb you give your model</a:t>
+            </a:r>
+          </a:p>
+          <a:p>
+            <a:pPr lvl="1"/>
+            <a:r>
+              <a:rPr lang="en-US" sz="2100" dirty="0"/>
+              <a:t>Encoding domain knowledge for the model to use</a:t>
+            </a:r>
+          </a:p>
+          <a:p>
+            <a:endParaRPr lang="en-US" dirty="0"/>
           </a:p>
           <a:p>
             <a:r>
               <a:rPr lang="en-US" dirty="0"/>
-              <a:t>Features for missing values</a:t>
-            </a:r>
+              <a:t>Feature generation is one of the most important part of the machine learning modeling process.</a:t>
+            </a:r>
+          </a:p>
+          <a:p>
+            <a:endParaRPr lang="en-US" dirty="0"/>
           </a:p>
           <a:p>
             <a:r>
               <a:rPr lang="en-US" dirty="0"/>
-              <a:t>Discretization</a:t>
-            </a:r>
-          </a:p>
-          <a:p>
-            <a:r>
-              <a:rPr lang="en-US" dirty="0"/>
-              <a:t>Date/Time Features</a:t>
-            </a:r>
-          </a:p>
-          <a:p>
-            <a:r>
-              <a:rPr lang="en-US" dirty="0"/>
-              <a:t>Scaling/Normalizing</a:t>
-            </a:r>
-          </a:p>
-          <a:p>
-            <a:r>
-              <a:rPr lang="en-US" dirty="0"/>
-              <a:t>Transformations</a:t>
-            </a:r>
-          </a:p>
-          <a:p>
-            <a:r>
-              <a:rPr lang="en-US" dirty="0"/>
-              <a:t>Aggregations (space, time, space and time)</a:t>
-            </a:r>
-          </a:p>
-          <a:p>
-            <a:r>
-              <a:rPr lang="en-US" dirty="0"/>
-              <a:t>Relative (compared to the average</a:t>
-            </a:r>
-            <a:r>
-              <a:rPr lang="mr-IN" dirty="0"/>
-              <a:t>…</a:t>
-            </a:r>
-            <a:r>
-              <a:rPr lang="en-US" dirty="0"/>
-              <a:t>)</a:t>
-            </a:r>
-          </a:p>
-          <a:p>
-            <a:r>
-              <a:rPr lang="en-US" dirty="0"/>
-              <a:t>Interactions</a:t>
-            </a:r>
-          </a:p>
-          <a:p>
-            <a:r>
-              <a:rPr lang="en-US" dirty="0"/>
-              <a:t>One-Hot Encoding</a:t>
-            </a:r>
+              <a:t>Reducing complexity in features may allow us to use less complex models that are faster to run, easier to understand, and easier to maintain.</a:t>
+            </a:r>
+          </a:p>
+          <a:p>
+            <a:endParaRPr lang="en-US" dirty="0"/>
+          </a:p>
+          <a:p>
+            <a:endParaRPr lang="en-US" dirty="0"/>
           </a:p>
         </p:txBody>
       </p:sp>
     </p:spTree>
     <p:extLst>
       <p:ext uri="{BB962C8B-B14F-4D97-AF65-F5344CB8AC3E}">
-        <p14:creationId xmlns:p14="http://schemas.microsoft.com/office/powerpoint/2010/main" val="273184349"/>
+        <p14:creationId xmlns:p14="http://schemas.microsoft.com/office/powerpoint/2010/main" val="837826461"/>
       </p:ext>
     </p:extLst>
   </p:cSld>
@@ -5752,7 +7706,7 @@
 </p:sld>
 </file>
 
-<file path=ppt/slides/slide5.xml><?xml version="1.0" encoding="utf-8"?>
+<file path=ppt/slides/slide7.xml><?xml version="1.0" encoding="utf-8"?>
 <p:sld xmlns:a="http://schemas.openxmlformats.org/drawingml/2006/main" xmlns:r="http://schemas.openxmlformats.org/officeDocument/2006/relationships" xmlns:p="http://schemas.openxmlformats.org/presentationml/2006/main">
   <p:cSld>
     <p:spTree>
@@ -5790,6 +7744,148 @@
                   <a:schemeClr val="tx1"/>
                 </a:solidFill>
               </a:rPr>
+              <a:t>Generating Features</a:t>
+            </a:r>
+          </a:p>
+        </p:txBody>
+      </p:sp>
+      <p:sp>
+        <p:nvSpPr>
+          <p:cNvPr id="2" name="Content Placeholder 1"/>
+          <p:cNvSpPr>
+            <a:spLocks noGrp="1"/>
+          </p:cNvSpPr>
+          <p:nvPr>
+            <p:ph idx="1"/>
+          </p:nvPr>
+        </p:nvSpPr>
+        <p:spPr/>
+        <p:txBody>
+          <a:bodyPr>
+            <a:normAutofit fontScale="92500" lnSpcReduction="20000"/>
+          </a:bodyPr>
+          <a:lstStyle/>
+          <a:p>
+            <a:r>
+              <a:rPr lang="en-US" dirty="0"/>
+              <a:t>Categorical to Binary (Dummies)</a:t>
+            </a:r>
+          </a:p>
+          <a:p>
+            <a:r>
+              <a:rPr lang="en-US" dirty="0"/>
+              <a:t>Features for missing values</a:t>
+            </a:r>
+          </a:p>
+          <a:p>
+            <a:r>
+              <a:rPr lang="en-US" dirty="0"/>
+              <a:t>Discretization</a:t>
+            </a:r>
+          </a:p>
+          <a:p>
+            <a:r>
+              <a:rPr lang="en-US" dirty="0"/>
+              <a:t>Date/Time Features</a:t>
+            </a:r>
+          </a:p>
+          <a:p>
+            <a:r>
+              <a:rPr lang="en-US" dirty="0"/>
+              <a:t>Scaling/Normalizing</a:t>
+            </a:r>
+          </a:p>
+          <a:p>
+            <a:r>
+              <a:rPr lang="en-US" dirty="0"/>
+              <a:t>Transformations</a:t>
+            </a:r>
+          </a:p>
+          <a:p>
+            <a:r>
+              <a:rPr lang="en-US" dirty="0"/>
+              <a:t>Aggregations (space, time, space and time)</a:t>
+            </a:r>
+          </a:p>
+          <a:p>
+            <a:r>
+              <a:rPr lang="en-US" dirty="0"/>
+              <a:t>Relative (compared to the average</a:t>
+            </a:r>
+            <a:r>
+              <a:rPr lang="mr-IN" dirty="0"/>
+              <a:t>…</a:t>
+            </a:r>
+            <a:r>
+              <a:rPr lang="en-US" dirty="0"/>
+              <a:t>)</a:t>
+            </a:r>
+          </a:p>
+          <a:p>
+            <a:r>
+              <a:rPr lang="en-US" dirty="0"/>
+              <a:t>Interactions</a:t>
+            </a:r>
+          </a:p>
+          <a:p>
+            <a:r>
+              <a:rPr lang="en-US" dirty="0"/>
+              <a:t>One-Hot Encoding</a:t>
+            </a:r>
+          </a:p>
+        </p:txBody>
+      </p:sp>
+    </p:spTree>
+    <p:extLst>
+      <p:ext uri="{BB962C8B-B14F-4D97-AF65-F5344CB8AC3E}">
+        <p14:creationId xmlns:p14="http://schemas.microsoft.com/office/powerpoint/2010/main" val="273184349"/>
+      </p:ext>
+    </p:extLst>
+  </p:cSld>
+  <p:clrMapOvr>
+    <a:masterClrMapping/>
+  </p:clrMapOvr>
+</p:sld>
+</file>
+
+<file path=ppt/slides/slide8.xml><?xml version="1.0" encoding="utf-8"?>
+<p:sld xmlns:a="http://schemas.openxmlformats.org/drawingml/2006/main" xmlns:r="http://schemas.openxmlformats.org/officeDocument/2006/relationships" xmlns:p="http://schemas.openxmlformats.org/presentationml/2006/main">
+  <p:cSld>
+    <p:spTree>
+      <p:nvGrpSpPr>
+        <p:cNvPr id="1" name=""/>
+        <p:cNvGrpSpPr/>
+        <p:nvPr/>
+      </p:nvGrpSpPr>
+      <p:grpSpPr>
+        <a:xfrm>
+          <a:off x="0" y="0"/>
+          <a:ext cx="0" cy="0"/>
+          <a:chOff x="0" y="0"/>
+          <a:chExt cx="0" cy="0"/>
+        </a:xfrm>
+      </p:grpSpPr>
+      <p:sp>
+        <p:nvSpPr>
+          <p:cNvPr id="3" name="Title 2"/>
+          <p:cNvSpPr>
+            <a:spLocks noGrp="1"/>
+          </p:cNvSpPr>
+          <p:nvPr>
+            <p:ph type="title"/>
+          </p:nvPr>
+        </p:nvSpPr>
+        <p:spPr/>
+        <p:txBody>
+          <a:bodyPr/>
+          <a:lstStyle/>
+          <a:p>
+            <a:r>
+              <a:rPr lang="en-US" dirty="0">
+                <a:solidFill>
+                  <a:schemeClr val="tx1"/>
+                </a:solidFill>
+              </a:rPr>
               <a:t>Categorical to Binary</a:t>
             </a:r>
           </a:p>
@@ -5845,7 +7941,7 @@
 </p:sld>
 </file>
 
-<file path=ppt/slides/slide6.xml><?xml version="1.0" encoding="utf-8"?>
+<file path=ppt/slides/slide9.xml><?xml version="1.0" encoding="utf-8"?>
 <p:sld xmlns:a="http://schemas.openxmlformats.org/drawingml/2006/main" xmlns:r="http://schemas.openxmlformats.org/officeDocument/2006/relationships" xmlns:p="http://schemas.openxmlformats.org/presentationml/2006/main">
   <p:cSld>
     <p:spTree>
@@ -6138,443 +8234,6 @@
       </p:par>
     </p:tnLst>
   </p:timing>
-</p:sld>
-</file>
-
-<file path=ppt/slides/slide7.xml><?xml version="1.0" encoding="utf-8"?>
-<p:sld xmlns:a="http://schemas.openxmlformats.org/drawingml/2006/main" xmlns:r="http://schemas.openxmlformats.org/officeDocument/2006/relationships" xmlns:p="http://schemas.openxmlformats.org/presentationml/2006/main">
-  <p:cSld>
-    <p:spTree>
-      <p:nvGrpSpPr>
-        <p:cNvPr id="1" name=""/>
-        <p:cNvGrpSpPr/>
-        <p:nvPr/>
-      </p:nvGrpSpPr>
-      <p:grpSpPr>
-        <a:xfrm>
-          <a:off x="0" y="0"/>
-          <a:ext cx="0" cy="0"/>
-          <a:chOff x="0" y="0"/>
-          <a:chExt cx="0" cy="0"/>
-        </a:xfrm>
-      </p:grpSpPr>
-      <p:sp>
-        <p:nvSpPr>
-          <p:cNvPr id="3" name="Title 2"/>
-          <p:cNvSpPr>
-            <a:spLocks noGrp="1"/>
-          </p:cNvSpPr>
-          <p:nvPr>
-            <p:ph type="title"/>
-          </p:nvPr>
-        </p:nvSpPr>
-        <p:spPr/>
-        <p:txBody>
-          <a:bodyPr/>
-          <a:lstStyle/>
-          <a:p>
-            <a:r>
-              <a:rPr lang="en-US" dirty="0">
-                <a:solidFill>
-                  <a:schemeClr val="tx1"/>
-                </a:solidFill>
-              </a:rPr>
-              <a:t>Normalization</a:t>
-            </a:r>
-          </a:p>
-        </p:txBody>
-      </p:sp>
-      <p:sp>
-        <p:nvSpPr>
-          <p:cNvPr id="2" name="Content Placeholder 1"/>
-          <p:cNvSpPr>
-            <a:spLocks noGrp="1"/>
-          </p:cNvSpPr>
-          <p:nvPr>
-            <p:ph type="body" idx="1"/>
-          </p:nvPr>
-        </p:nvSpPr>
-        <p:spPr/>
-        <p:txBody>
-          <a:bodyPr/>
-          <a:lstStyle/>
-          <a:p>
-            <a:r>
-              <a:rPr lang="en-US" dirty="0"/>
-              <a:t>Usually a good idea to scale features to have similar range:  [-1,1] or [0,1] for example</a:t>
-            </a:r>
-          </a:p>
-          <a:p>
-            <a:pPr lvl="1"/>
-            <a:r>
-              <a:rPr lang="en-US" sz="2100" dirty="0"/>
-              <a:t>Be careful with outliers</a:t>
-            </a:r>
-          </a:p>
-          <a:p>
-            <a:pPr lvl="1"/>
-            <a:endParaRPr lang="en-US" sz="2100" dirty="0"/>
-          </a:p>
-          <a:p>
-            <a:r>
-              <a:rPr lang="en-US" dirty="0"/>
-              <a:t>Standardize/Normalize</a:t>
-            </a:r>
-          </a:p>
-          <a:p>
-            <a:pPr lvl="1"/>
-            <a:r>
-              <a:rPr lang="en-US" sz="2100" dirty="0"/>
-              <a:t>Zero mean and unit variance</a:t>
-            </a:r>
-          </a:p>
-          <a:p>
-            <a:pPr lvl="1"/>
-            <a:r>
-              <a:rPr lang="en-US" sz="2100" dirty="0" err="1"/>
-              <a:t>Sklearn.preprocessing.normalize</a:t>
-            </a:r>
-            <a:endParaRPr lang="en-US" sz="2100" dirty="0"/>
-          </a:p>
-        </p:txBody>
-      </p:sp>
-      <p:pic>
-        <p:nvPicPr>
-          <p:cNvPr id="4" name="Picture 3"/>
-          <p:cNvPicPr>
-            <a:picLocks noChangeAspect="1"/>
-          </p:cNvPicPr>
-          <p:nvPr/>
-        </p:nvPicPr>
-        <p:blipFill>
-          <a:blip r:embed="rId2"/>
-          <a:stretch>
-            <a:fillRect/>
-          </a:stretch>
-        </p:blipFill>
-        <p:spPr>
-          <a:xfrm>
-            <a:off x="5418754" y="3012656"/>
-            <a:ext cx="1905000" cy="828675"/>
-          </a:xfrm>
-          <a:prstGeom prst="rect">
-            <a:avLst/>
-          </a:prstGeom>
-        </p:spPr>
-      </p:pic>
-    </p:spTree>
-    <p:extLst>
-      <p:ext uri="{BB962C8B-B14F-4D97-AF65-F5344CB8AC3E}">
-        <p14:creationId xmlns:p14="http://schemas.microsoft.com/office/powerpoint/2010/main" val="1008191164"/>
-      </p:ext>
-    </p:extLst>
-  </p:cSld>
-  <p:clrMapOvr>
-    <a:masterClrMapping/>
-  </p:clrMapOvr>
-</p:sld>
-</file>
-
-<file path=ppt/slides/slide8.xml><?xml version="1.0" encoding="utf-8"?>
-<p:sld xmlns:a="http://schemas.openxmlformats.org/drawingml/2006/main" xmlns:r="http://schemas.openxmlformats.org/officeDocument/2006/relationships" xmlns:p="http://schemas.openxmlformats.org/presentationml/2006/main">
-  <p:cSld>
-    <p:spTree>
-      <p:nvGrpSpPr>
-        <p:cNvPr id="1" name=""/>
-        <p:cNvGrpSpPr/>
-        <p:nvPr/>
-      </p:nvGrpSpPr>
-      <p:grpSpPr>
-        <a:xfrm>
-          <a:off x="0" y="0"/>
-          <a:ext cx="0" cy="0"/>
-          <a:chOff x="0" y="0"/>
-          <a:chExt cx="0" cy="0"/>
-        </a:xfrm>
-      </p:grpSpPr>
-      <p:sp>
-        <p:nvSpPr>
-          <p:cNvPr id="3" name="Title 2"/>
-          <p:cNvSpPr>
-            <a:spLocks noGrp="1"/>
-          </p:cNvSpPr>
-          <p:nvPr>
-            <p:ph type="title"/>
-          </p:nvPr>
-        </p:nvSpPr>
-        <p:spPr/>
-        <p:txBody>
-          <a:bodyPr/>
-          <a:lstStyle/>
-          <a:p>
-            <a:r>
-              <a:rPr lang="en-US" dirty="0">
-                <a:solidFill>
-                  <a:schemeClr val="tx1"/>
-                </a:solidFill>
-              </a:rPr>
-              <a:t>Feature Transformations</a:t>
-            </a:r>
-          </a:p>
-        </p:txBody>
-      </p:sp>
-      <p:sp>
-        <p:nvSpPr>
-          <p:cNvPr id="2" name="Content Placeholder 1"/>
-          <p:cNvSpPr>
-            <a:spLocks noGrp="1"/>
-          </p:cNvSpPr>
-          <p:nvPr>
-            <p:ph idx="1"/>
-          </p:nvPr>
-        </p:nvSpPr>
-        <p:spPr/>
-        <p:txBody>
-          <a:bodyPr/>
-          <a:lstStyle/>
-          <a:p>
-            <a:r>
-              <a:rPr lang="en-US" dirty="0"/>
-              <a:t>Non-linear </a:t>
-            </a:r>
-          </a:p>
-          <a:p>
-            <a:endParaRPr lang="en-US" dirty="0"/>
-          </a:p>
-          <a:p>
-            <a:pPr lvl="1"/>
-            <a:r>
-              <a:rPr lang="en-US" dirty="0"/>
-              <a:t>Log (decreasing marginal utility)</a:t>
-            </a:r>
-          </a:p>
-          <a:p>
-            <a:pPr marL="342900" lvl="1" indent="0">
-              <a:buNone/>
-            </a:pPr>
-            <a:endParaRPr lang="en-US" dirty="0"/>
-          </a:p>
-          <a:p>
-            <a:pPr lvl="1"/>
-            <a:r>
-              <a:rPr lang="en-US" dirty="0"/>
-              <a:t>(Square) Root</a:t>
-            </a:r>
-          </a:p>
-          <a:p>
-            <a:pPr lvl="1"/>
-            <a:endParaRPr lang="en-US" dirty="0"/>
-          </a:p>
-          <a:p>
-            <a:pPr lvl="1"/>
-            <a:r>
-              <a:rPr lang="en-US" dirty="0"/>
-              <a:t>Squared</a:t>
-            </a:r>
-          </a:p>
-        </p:txBody>
-      </p:sp>
-      <p:pic>
-        <p:nvPicPr>
-          <p:cNvPr id="4" name="Picture 3"/>
-          <p:cNvPicPr>
-            <a:picLocks noChangeAspect="1"/>
-          </p:cNvPicPr>
-          <p:nvPr/>
-        </p:nvPicPr>
-        <p:blipFill>
-          <a:blip r:embed="rId2"/>
-          <a:stretch>
-            <a:fillRect/>
-          </a:stretch>
-        </p:blipFill>
-        <p:spPr>
-          <a:xfrm>
-            <a:off x="6806589" y="3419683"/>
-            <a:ext cx="1531984" cy="1249776"/>
-          </a:xfrm>
-          <a:prstGeom prst="rect">
-            <a:avLst/>
-          </a:prstGeom>
-        </p:spPr>
-      </p:pic>
-      <p:pic>
-        <p:nvPicPr>
-          <p:cNvPr id="5" name="Picture 4"/>
-          <p:cNvPicPr>
-            <a:picLocks noChangeAspect="1"/>
-          </p:cNvPicPr>
-          <p:nvPr/>
-        </p:nvPicPr>
-        <p:blipFill>
-          <a:blip r:embed="rId3"/>
-          <a:stretch>
-            <a:fillRect/>
-          </a:stretch>
-        </p:blipFill>
-        <p:spPr>
-          <a:xfrm>
-            <a:off x="4436028" y="3260015"/>
-            <a:ext cx="1876910" cy="1460364"/>
-          </a:xfrm>
-          <a:prstGeom prst="rect">
-            <a:avLst/>
-          </a:prstGeom>
-        </p:spPr>
-      </p:pic>
-      <p:pic>
-        <p:nvPicPr>
-          <p:cNvPr id="6" name="Picture 5"/>
-          <p:cNvPicPr>
-            <a:picLocks noChangeAspect="1"/>
-          </p:cNvPicPr>
-          <p:nvPr/>
-        </p:nvPicPr>
-        <p:blipFill>
-          <a:blip r:embed="rId4"/>
-          <a:stretch>
-            <a:fillRect/>
-          </a:stretch>
-        </p:blipFill>
-        <p:spPr>
-          <a:xfrm>
-            <a:off x="2981930" y="3475109"/>
-            <a:ext cx="1314612" cy="1396775"/>
-          </a:xfrm>
-          <a:prstGeom prst="rect">
-            <a:avLst/>
-          </a:prstGeom>
-        </p:spPr>
-      </p:pic>
-    </p:spTree>
-    <p:extLst>
-      <p:ext uri="{BB962C8B-B14F-4D97-AF65-F5344CB8AC3E}">
-        <p14:creationId xmlns:p14="http://schemas.microsoft.com/office/powerpoint/2010/main" val="3282596412"/>
-      </p:ext>
-    </p:extLst>
-  </p:cSld>
-  <p:clrMapOvr>
-    <a:masterClrMapping/>
-  </p:clrMapOvr>
-</p:sld>
-</file>
-
-<file path=ppt/slides/slide9.xml><?xml version="1.0" encoding="utf-8"?>
-<p:sld xmlns:a="http://schemas.openxmlformats.org/drawingml/2006/main" xmlns:r="http://schemas.openxmlformats.org/officeDocument/2006/relationships" xmlns:p="http://schemas.openxmlformats.org/presentationml/2006/main">
-  <p:cSld>
-    <p:spTree>
-      <p:nvGrpSpPr>
-        <p:cNvPr id="1" name=""/>
-        <p:cNvGrpSpPr/>
-        <p:nvPr/>
-      </p:nvGrpSpPr>
-      <p:grpSpPr>
-        <a:xfrm>
-          <a:off x="0" y="0"/>
-          <a:ext cx="0" cy="0"/>
-          <a:chOff x="0" y="0"/>
-          <a:chExt cx="0" cy="0"/>
-        </a:xfrm>
-      </p:grpSpPr>
-      <p:sp>
-        <p:nvSpPr>
-          <p:cNvPr id="3" name="Title 2"/>
-          <p:cNvSpPr>
-            <a:spLocks noGrp="1"/>
-          </p:cNvSpPr>
-          <p:nvPr>
-            <p:ph type="title"/>
-          </p:nvPr>
-        </p:nvSpPr>
-        <p:spPr/>
-        <p:txBody>
-          <a:bodyPr/>
-          <a:lstStyle/>
-          <a:p>
-            <a:r>
-              <a:rPr lang="en-US" dirty="0">
-                <a:solidFill>
-                  <a:schemeClr val="tx1"/>
-                </a:solidFill>
-              </a:rPr>
-              <a:t>Aggregation</a:t>
-            </a:r>
-          </a:p>
-        </p:txBody>
-      </p:sp>
-      <p:sp>
-        <p:nvSpPr>
-          <p:cNvPr id="2" name="Content Placeholder 1"/>
-          <p:cNvSpPr>
-            <a:spLocks noGrp="1"/>
-          </p:cNvSpPr>
-          <p:nvPr>
-            <p:ph idx="1"/>
-          </p:nvPr>
-        </p:nvSpPr>
-        <p:spPr/>
-        <p:txBody>
-          <a:bodyPr>
-            <a:normAutofit/>
-          </a:bodyPr>
-          <a:lstStyle/>
-          <a:p>
-            <a:r>
-              <a:rPr lang="en-US" sz="2700" dirty="0"/>
-              <a:t>Date differences (# of days since…)</a:t>
-            </a:r>
-          </a:p>
-          <a:p>
-            <a:r>
-              <a:rPr lang="en-US" sz="2700" dirty="0"/>
-              <a:t>Aggregates over different time periods</a:t>
-            </a:r>
-          </a:p>
-          <a:p>
-            <a:r>
-              <a:rPr lang="en-US" sz="2700" dirty="0"/>
-              <a:t>Relative aggregates</a:t>
-            </a:r>
-          </a:p>
-          <a:p>
-            <a:r>
-              <a:rPr lang="en-US" sz="2700" dirty="0"/>
-              <a:t>Distances</a:t>
-            </a:r>
-          </a:p>
-          <a:p>
-            <a:r>
-              <a:rPr lang="en-US" sz="2700" dirty="0"/>
-              <a:t>Aggregates over different distances</a:t>
-            </a:r>
-          </a:p>
-          <a:p>
-            <a:r>
-              <a:rPr lang="en-US" sz="2700" dirty="0"/>
-              <a:t>Seasonality</a:t>
-            </a:r>
-          </a:p>
-          <a:p>
-            <a:endParaRPr lang="en-US" sz="2700" dirty="0"/>
-          </a:p>
-          <a:p>
-            <a:endParaRPr lang="en-US" sz="2700" dirty="0"/>
-          </a:p>
-          <a:p>
-            <a:endParaRPr lang="en-US" sz="2700" dirty="0"/>
-          </a:p>
-        </p:txBody>
-      </p:sp>
-    </p:spTree>
-    <p:extLst>
-      <p:ext uri="{BB962C8B-B14F-4D97-AF65-F5344CB8AC3E}">
-        <p14:creationId xmlns:p14="http://schemas.microsoft.com/office/powerpoint/2010/main" val="3227679789"/>
-      </p:ext>
-    </p:extLst>
-  </p:cSld>
-  <p:clrMapOvr>
-    <a:masterClrMapping/>
-  </p:clrMapOvr>
 </p:sld>
 </file>
 

</xml_diff>